<commit_message>
add data .csv and update slide
</commit_message>
<xml_diff>
--- a/report-slide/BaoCaoLan01_DS.pptx
+++ b/report-slide/BaoCaoLan01_DS.pptx
@@ -20,9 +20,9 @@
     <p:sldId id="283" r:id="rId8"/>
     <p:sldId id="288" r:id="rId9"/>
     <p:sldId id="289" r:id="rId10"/>
-    <p:sldId id="285" r:id="rId11"/>
-    <p:sldId id="286" r:id="rId12"/>
-    <p:sldId id="287" r:id="rId13"/>
+    <p:sldId id="286" r:id="rId11"/>
+    <p:sldId id="287" r:id="rId12"/>
+    <p:sldId id="285" r:id="rId13"/>
     <p:sldId id="273" r:id="rId14"/>
   </p:sldIdLst>
   <p:sldSz cx="12192000" cy="6858000"/>
@@ -1384,7 +1384,7 @@
           <a:p>
             <a:fld id="{AB2EF4F0-B01F-49F6-8BE3-F23017C9D067}" type="slidenum">
               <a:rPr lang="en-US" smtClean="0"/>
-              <a:t>10</a:t>
+              <a:t>12</a:t>
             </a:fld>
             <a:endParaRPr lang="en-US"/>
           </a:p>
@@ -5957,7 +5957,7 @@
 </file>
 
 <file path=ppt/slides/slide10.xml><?xml version="1.0" encoding="utf-8"?>
-<p:sld xmlns:a="http://schemas.openxmlformats.org/drawingml/2006/main" xmlns:r="http://schemas.openxmlformats.org/officeDocument/2006/relationships" xmlns:p="http://schemas.openxmlformats.org/presentationml/2006/main" show="0">
+<p:sld xmlns:a="http://schemas.openxmlformats.org/drawingml/2006/main" xmlns:r="http://schemas.openxmlformats.org/officeDocument/2006/relationships" xmlns:p="http://schemas.openxmlformats.org/presentationml/2006/main">
   <p:cSld>
     <p:spTree>
       <p:nvGrpSpPr>
@@ -6009,17 +6009,35 @@
                 </a:solidFill>
                 <a:latin typeface="Calibri (Body)"/>
               </a:rPr>
-              <a:t>THU THẬP DỮ LIỆU – LẤY DỮ LIỆU CẦN QUAN TÂM</a:t>
+              <a:t>THU THẬP DỮ LIỆU – THÔNG TIN DỮ LIỆU LẤY Đ</a:t>
+            </a:r>
+            <a:r>
+              <a:rPr lang="vi-VN" sz="2400" b="1" dirty="0">
+                <a:solidFill>
+                  <a:schemeClr val="bg1"/>
+                </a:solidFill>
+                <a:latin typeface="Calibri (Body)"/>
+              </a:rPr>
+              <a:t>Ư</a:t>
+            </a:r>
+            <a:r>
+              <a:rPr lang="en-US" sz="2400" b="1" dirty="0">
+                <a:solidFill>
+                  <a:schemeClr val="bg1"/>
+                </a:solidFill>
+                <a:latin typeface="Calibri (Body)"/>
+              </a:rPr>
+              <a:t>ỢC</a:t>
             </a:r>
           </a:p>
         </p:txBody>
       </p:sp>
       <p:sp>
         <p:nvSpPr>
-          <p:cNvPr id="10" name="Rectangle 9">
+          <p:cNvPr id="8" name="Rectangle 7">
             <a:extLst>
               <a:ext uri="{FF2B5EF4-FFF2-40B4-BE49-F238E27FC236}">
-                <a16:creationId xmlns:a16="http://schemas.microsoft.com/office/drawing/2014/main" id="{65E32CB8-99EA-442F-BDA2-2842973F24B7}"/>
+                <a16:creationId xmlns:a16="http://schemas.microsoft.com/office/drawing/2014/main" id="{A70019AA-1DDD-43D1-A944-F1E48142597A}"/>
               </a:ext>
             </a:extLst>
           </p:cNvPr>
@@ -6028,12 +6046,17 @@
         </p:nvSpPr>
         <p:spPr>
           <a:xfrm>
-            <a:off x="4357082" y="1022603"/>
-            <a:ext cx="7093952" cy="646331"/>
+            <a:off x="505775" y="707871"/>
+            <a:ext cx="3774826" cy="4185761"/>
           </a:xfrm>
           <a:prstGeom prst="rect">
             <a:avLst/>
           </a:prstGeom>
+          <a:ln w="28575">
+            <a:solidFill>
+              <a:srgbClr val="0070C0"/>
+            </a:solidFill>
+          </a:ln>
         </p:spPr>
         <p:txBody>
           <a:bodyPr wrap="square">
@@ -6043,1355 +6066,305 @@
           <a:p>
             <a:pPr algn="just"/>
             <a:r>
-              <a:rPr lang="en-US" dirty="0" err="1">
-                <a:latin typeface="Helvetica Neue"/>
-              </a:rPr>
-              <a:t>Dữ</a:t>
-            </a:r>
-            <a:r>
-              <a:rPr lang="en-US" dirty="0">
-                <a:latin typeface="Helvetica Neue"/>
-              </a:rPr>
-              <a:t> </a:t>
-            </a:r>
-            <a:r>
-              <a:rPr lang="en-US" dirty="0" err="1">
-                <a:latin typeface="Helvetica Neue"/>
-              </a:rPr>
-              <a:t>liệu</a:t>
-            </a:r>
-            <a:r>
-              <a:rPr lang="en-US" dirty="0">
-                <a:latin typeface="Helvetica Neue"/>
-              </a:rPr>
-              <a:t> </a:t>
-            </a:r>
-            <a:r>
-              <a:rPr lang="en-US" dirty="0" err="1">
-                <a:latin typeface="Helvetica Neue"/>
-              </a:rPr>
-              <a:t>thu</a:t>
-            </a:r>
-            <a:r>
-              <a:rPr lang="en-US" dirty="0">
-                <a:latin typeface="Helvetica Neue"/>
-              </a:rPr>
-              <a:t> đ</a:t>
-            </a:r>
-            <a:r>
-              <a:rPr lang="vi-VN" dirty="0">
-                <a:latin typeface="Helvetica Neue"/>
-              </a:rPr>
-              <a:t>ư</a:t>
-            </a:r>
-            <a:r>
-              <a:rPr lang="en-US" dirty="0" err="1">
-                <a:latin typeface="Helvetica Neue"/>
-              </a:rPr>
-              <a:t>ợc</a:t>
-            </a:r>
-            <a:r>
-              <a:rPr lang="en-US" dirty="0">
-                <a:latin typeface="Helvetica Neue"/>
-              </a:rPr>
-              <a:t> </a:t>
-            </a:r>
-            <a:r>
-              <a:rPr lang="en-US" dirty="0" err="1">
-                <a:latin typeface="Helvetica Neue"/>
-              </a:rPr>
-              <a:t>từ</a:t>
-            </a:r>
-            <a:r>
-              <a:rPr lang="en-US" dirty="0">
-                <a:latin typeface="Helvetica Neue"/>
-              </a:rPr>
-              <a:t> </a:t>
-            </a:r>
-            <a:r>
-              <a:rPr lang="en-US" dirty="0" err="1">
-                <a:latin typeface="Helvetica Neue"/>
-              </a:rPr>
-              <a:t>trang</a:t>
-            </a:r>
-            <a:r>
-              <a:rPr lang="en-US" dirty="0">
-                <a:latin typeface="Helvetica Neue"/>
-              </a:rPr>
-              <a:t> web </a:t>
-            </a:r>
-            <a:r>
-              <a:rPr lang="en-US" dirty="0" err="1">
-                <a:latin typeface="Helvetica Neue"/>
-              </a:rPr>
-              <a:t>là</a:t>
-            </a:r>
-            <a:r>
-              <a:rPr lang="en-US" dirty="0">
-                <a:latin typeface="Helvetica Neue"/>
-              </a:rPr>
-              <a:t> </a:t>
-            </a:r>
-            <a:r>
-              <a:rPr lang="en-US" dirty="0">
-                <a:solidFill>
-                  <a:srgbClr val="FF0000"/>
-                </a:solidFill>
-                <a:latin typeface="Helvetica Neue"/>
-              </a:rPr>
-              <a:t>26220 </a:t>
-            </a:r>
-            <a:r>
-              <a:rPr lang="en-US" dirty="0" err="1">
-                <a:solidFill>
-                  <a:srgbClr val="FF0000"/>
-                </a:solidFill>
-                <a:latin typeface="Helvetica Neue"/>
-              </a:rPr>
-              <a:t>bản</a:t>
-            </a:r>
-            <a:r>
-              <a:rPr lang="en-US" dirty="0">
-                <a:solidFill>
-                  <a:srgbClr val="FF0000"/>
-                </a:solidFill>
-                <a:latin typeface="Helvetica Neue"/>
-              </a:rPr>
-              <a:t> tin</a:t>
-            </a:r>
-            <a:r>
-              <a:rPr lang="en-US" dirty="0">
-                <a:latin typeface="Helvetica Neue"/>
-              </a:rPr>
-              <a:t>, </a:t>
-            </a:r>
-            <a:r>
-              <a:rPr lang="en-US" dirty="0" err="1">
-                <a:latin typeface="Helvetica Neue"/>
-              </a:rPr>
-              <a:t>sau</a:t>
-            </a:r>
-            <a:r>
-              <a:rPr lang="en-US" dirty="0">
-                <a:latin typeface="Helvetica Neue"/>
-              </a:rPr>
-              <a:t> </a:t>
-            </a:r>
-            <a:r>
-              <a:rPr lang="en-US" dirty="0" err="1">
-                <a:latin typeface="Helvetica Neue"/>
-              </a:rPr>
-              <a:t>khi</a:t>
-            </a:r>
-            <a:r>
-              <a:rPr lang="en-US" dirty="0">
-                <a:latin typeface="Helvetica Neue"/>
-              </a:rPr>
-              <a:t> </a:t>
-            </a:r>
-            <a:r>
-              <a:rPr lang="en-US" dirty="0" err="1">
-                <a:latin typeface="Helvetica Neue"/>
-              </a:rPr>
-              <a:t>xóa</a:t>
-            </a:r>
-            <a:r>
-              <a:rPr lang="en-US" dirty="0">
-                <a:latin typeface="Helvetica Neue"/>
-              </a:rPr>
-              <a:t> </a:t>
-            </a:r>
-            <a:r>
-              <a:rPr lang="en-US" dirty="0" err="1">
-                <a:latin typeface="Helvetica Neue"/>
-              </a:rPr>
-              <a:t>các</a:t>
-            </a:r>
-            <a:r>
-              <a:rPr lang="en-US" dirty="0">
-                <a:latin typeface="Helvetica Neue"/>
-              </a:rPr>
-              <a:t> </a:t>
-            </a:r>
-            <a:r>
-              <a:rPr lang="en-US" dirty="0" err="1">
-                <a:latin typeface="Helvetica Neue"/>
-              </a:rPr>
-              <a:t>bản</a:t>
-            </a:r>
-            <a:r>
-              <a:rPr lang="en-US" dirty="0">
-                <a:latin typeface="Helvetica Neue"/>
-              </a:rPr>
-              <a:t> tin </a:t>
-            </a:r>
-            <a:r>
-              <a:rPr lang="en-US" dirty="0" err="1">
-                <a:latin typeface="Helvetica Neue"/>
-              </a:rPr>
-              <a:t>trùng</a:t>
-            </a:r>
-            <a:r>
-              <a:rPr lang="en-US" dirty="0">
-                <a:latin typeface="Helvetica Neue"/>
-              </a:rPr>
-              <a:t> </a:t>
-            </a:r>
-            <a:r>
-              <a:rPr lang="en-US" dirty="0" err="1">
-                <a:latin typeface="Helvetica Neue"/>
-              </a:rPr>
-              <a:t>nhau</a:t>
-            </a:r>
-            <a:r>
-              <a:rPr lang="en-US" dirty="0">
-                <a:latin typeface="Helvetica Neue"/>
-              </a:rPr>
-              <a:t> </a:t>
-            </a:r>
-            <a:r>
-              <a:rPr lang="en-US" dirty="0" err="1">
-                <a:latin typeface="Helvetica Neue"/>
-              </a:rPr>
-              <a:t>thì</a:t>
-            </a:r>
-            <a:r>
-              <a:rPr lang="en-US" dirty="0">
-                <a:latin typeface="Helvetica Neue"/>
-              </a:rPr>
-              <a:t> </a:t>
-            </a:r>
-            <a:r>
-              <a:rPr lang="en-US" dirty="0" err="1">
-                <a:latin typeface="Helvetica Neue"/>
-              </a:rPr>
-              <a:t>thu</a:t>
-            </a:r>
-            <a:r>
-              <a:rPr lang="en-US" dirty="0">
-                <a:latin typeface="Helvetica Neue"/>
-              </a:rPr>
-              <a:t> </a:t>
-            </a:r>
-            <a:r>
-              <a:rPr lang="en-US" dirty="0" err="1">
-                <a:latin typeface="Helvetica Neue"/>
-              </a:rPr>
-              <a:t>lại</a:t>
-            </a:r>
-            <a:r>
-              <a:rPr lang="en-US" dirty="0">
-                <a:latin typeface="Helvetica Neue"/>
-              </a:rPr>
-              <a:t> đ</a:t>
-            </a:r>
-            <a:r>
-              <a:rPr lang="vi-VN" dirty="0">
-                <a:latin typeface="Helvetica Neue"/>
-              </a:rPr>
-              <a:t>ư</a:t>
-            </a:r>
-            <a:r>
-              <a:rPr lang="en-US" dirty="0" err="1">
-                <a:latin typeface="Helvetica Neue"/>
-              </a:rPr>
-              <a:t>ợc</a:t>
-            </a:r>
-            <a:r>
-              <a:rPr lang="en-US" dirty="0">
-                <a:latin typeface="Helvetica Neue"/>
-              </a:rPr>
-              <a:t> </a:t>
-            </a:r>
-            <a:r>
-              <a:rPr lang="en-US" dirty="0">
-                <a:solidFill>
-                  <a:srgbClr val="00B050"/>
-                </a:solidFill>
-                <a:latin typeface="Helvetica Neue"/>
-              </a:rPr>
-              <a:t>19957 </a:t>
-            </a:r>
-            <a:r>
-              <a:rPr lang="en-US" dirty="0" err="1">
-                <a:solidFill>
-                  <a:srgbClr val="00B050"/>
-                </a:solidFill>
-                <a:latin typeface="Helvetica Neue"/>
-              </a:rPr>
-              <a:t>bản</a:t>
-            </a:r>
-            <a:r>
-              <a:rPr lang="en-US" dirty="0">
-                <a:solidFill>
-                  <a:srgbClr val="00B050"/>
-                </a:solidFill>
-                <a:latin typeface="Helvetica Neue"/>
-              </a:rPr>
-              <a:t> tin</a:t>
-            </a:r>
-            <a:r>
-              <a:rPr lang="en-US" dirty="0">
-                <a:latin typeface="Helvetica Neue"/>
-              </a:rPr>
-              <a:t>. </a:t>
+              <a:rPr lang="en-US" sz="1400" dirty="0">
+                <a:latin typeface="Helvetica Neue"/>
+              </a:rPr>
+              <a:t>1. </a:t>
+            </a:r>
+            <a:r>
+              <a:rPr lang="vi-VN" sz="1400" dirty="0">
+                <a:latin typeface="Helvetica Neue"/>
+              </a:rPr>
+              <a:t>address_street: tên đường.</a:t>
+            </a:r>
+          </a:p>
+          <a:p>
+            <a:pPr algn="just"/>
+            <a:r>
+              <a:rPr lang="en-US" sz="1400" dirty="0">
+                <a:latin typeface="Helvetica Neue"/>
+              </a:rPr>
+              <a:t>2. </a:t>
+            </a:r>
+            <a:r>
+              <a:rPr lang="vi-VN" sz="1400" dirty="0">
+                <a:latin typeface="Helvetica Neue"/>
+              </a:rPr>
+              <a:t>address_locality: tên địa phương.</a:t>
+            </a:r>
+          </a:p>
+          <a:p>
+            <a:pPr algn="just"/>
+            <a:r>
+              <a:rPr lang="en-US" sz="1400" dirty="0">
+                <a:latin typeface="Helvetica Neue"/>
+              </a:rPr>
+              <a:t>3. </a:t>
+            </a:r>
+            <a:r>
+              <a:rPr lang="vi-VN" sz="1400" dirty="0">
+                <a:latin typeface="Helvetica Neue"/>
+              </a:rPr>
+              <a:t>address_region: tên vùng.</a:t>
+            </a:r>
+          </a:p>
+          <a:p>
+            <a:pPr algn="just"/>
+            <a:r>
+              <a:rPr lang="en-US" sz="1400" dirty="0">
+                <a:latin typeface="Helvetica Neue"/>
+              </a:rPr>
+              <a:t>4. </a:t>
+            </a:r>
+            <a:r>
+              <a:rPr lang="vi-VN" sz="1400" dirty="0">
+                <a:latin typeface="Helvetica Neue"/>
+              </a:rPr>
+              <a:t>address_code: mã vùng.</a:t>
+            </a:r>
+          </a:p>
+          <a:p>
+            <a:pPr algn="just"/>
+            <a:r>
+              <a:rPr lang="en-US" sz="1400" dirty="0">
+                <a:latin typeface="Helvetica Neue"/>
+              </a:rPr>
+              <a:t>5. </a:t>
+            </a:r>
+            <a:r>
+              <a:rPr lang="vi-VN" sz="1400" dirty="0">
+                <a:latin typeface="Helvetica Neue"/>
+              </a:rPr>
+              <a:t>date_sold: ngày bán thành công ngôi nhà.</a:t>
+            </a:r>
+          </a:p>
+          <a:p>
+            <a:pPr algn="just"/>
+            <a:r>
+              <a:rPr lang="en-US" sz="1400" dirty="0">
+                <a:latin typeface="Helvetica Neue"/>
+              </a:rPr>
+              <a:t>6. </a:t>
+            </a:r>
+            <a:r>
+              <a:rPr lang="vi-VN" sz="1400" dirty="0">
+                <a:latin typeface="Helvetica Neue"/>
+              </a:rPr>
+              <a:t>mortgage: giá thuê nhà hằng tháng trước khi được bán đi.</a:t>
+            </a:r>
+          </a:p>
+          <a:p>
+            <a:pPr algn="just"/>
+            <a:r>
+              <a:rPr lang="en-US" sz="1400" dirty="0">
+                <a:latin typeface="Helvetica Neue"/>
+              </a:rPr>
+              <a:t>7. </a:t>
+            </a:r>
+            <a:r>
+              <a:rPr lang="vi-VN" sz="1400" dirty="0">
+                <a:latin typeface="Helvetica Neue"/>
+              </a:rPr>
+              <a:t>info_type: loại nhà.</a:t>
+            </a:r>
+          </a:p>
+          <a:p>
+            <a:pPr algn="just"/>
+            <a:r>
+              <a:rPr lang="en-US" sz="1400" dirty="0">
+                <a:latin typeface="Helvetica Neue"/>
+              </a:rPr>
+              <a:t>8. </a:t>
+            </a:r>
+            <a:r>
+              <a:rPr lang="vi-VN" sz="1400" dirty="0">
+                <a:latin typeface="Helvetica Neue"/>
+              </a:rPr>
+              <a:t>info_bedrooms: số lượng phòng ngủ.</a:t>
+            </a:r>
+          </a:p>
+          <a:p>
+            <a:pPr algn="just"/>
+            <a:r>
+              <a:rPr lang="en-US" sz="1400" dirty="0">
+                <a:latin typeface="Helvetica Neue"/>
+              </a:rPr>
+              <a:t>9. </a:t>
+            </a:r>
+            <a:r>
+              <a:rPr lang="vi-VN" sz="1400" dirty="0">
+                <a:latin typeface="Helvetica Neue"/>
+              </a:rPr>
+              <a:t>info_bathrooms: số lượng phòng tắm.</a:t>
+            </a:r>
+          </a:p>
+          <a:p>
+            <a:pPr algn="just"/>
+            <a:r>
+              <a:rPr lang="en-US" sz="1400" dirty="0">
+                <a:latin typeface="Helvetica Neue"/>
+              </a:rPr>
+              <a:t>10. </a:t>
+            </a:r>
+            <a:r>
+              <a:rPr lang="vi-VN" sz="1400" dirty="0">
+                <a:latin typeface="Helvetica Neue"/>
+              </a:rPr>
+              <a:t>info_size: kích thước ngôi nhà (sqft).</a:t>
+            </a:r>
+          </a:p>
+          <a:p>
+            <a:pPr algn="just"/>
+            <a:r>
+              <a:rPr lang="en-US" sz="1400" dirty="0">
+                <a:latin typeface="Helvetica Neue"/>
+              </a:rPr>
+              <a:t>11.</a:t>
+            </a:r>
+            <a:r>
+              <a:rPr lang="vi-VN" sz="1400" dirty="0">
+                <a:latin typeface="Helvetica Neue"/>
+              </a:rPr>
+              <a:t>info_lot_size: kích thước lô đất (sqft).</a:t>
+            </a:r>
+          </a:p>
+          <a:p>
+            <a:pPr algn="just"/>
+            <a:r>
+              <a:rPr lang="en-US" sz="1400" dirty="0">
+                <a:latin typeface="Helvetica Neue"/>
+              </a:rPr>
+              <a:t>12. </a:t>
+            </a:r>
+            <a:r>
+              <a:rPr lang="vi-VN" sz="1400" dirty="0">
+                <a:latin typeface="Helvetica Neue"/>
+              </a:rPr>
+              <a:t>info_year_build: năm ngôi nhà được xây dựng.</a:t>
+            </a:r>
+          </a:p>
+          <a:p>
+            <a:pPr algn="just"/>
+            <a:r>
+              <a:rPr lang="en-US" sz="1400" dirty="0">
+                <a:latin typeface="Helvetica Neue"/>
+              </a:rPr>
+              <a:t>13. </a:t>
+            </a:r>
+            <a:r>
+              <a:rPr lang="vi-VN" sz="1400" dirty="0">
+                <a:latin typeface="Helvetica Neue"/>
+              </a:rPr>
+              <a:t>info_est_value: giá rao bán.</a:t>
+            </a:r>
+            <a:endParaRPr lang="en-US" sz="1400" dirty="0">
+              <a:latin typeface="Helvetica Neue"/>
+            </a:endParaRPr>
+          </a:p>
+          <a:p>
+            <a:pPr algn="just"/>
+            <a:r>
+              <a:rPr lang="en-US" sz="1400" dirty="0">
+                <a:latin typeface="Helvetica Neue"/>
+              </a:rPr>
+              <a:t>14. </a:t>
+            </a:r>
+            <a:r>
+              <a:rPr lang="vi-VN" sz="1400" dirty="0">
+                <a:latin typeface="Helvetica Neue"/>
+              </a:rPr>
+              <a:t>info_sold_price: giá bán thành công.</a:t>
+            </a:r>
+            <a:endParaRPr lang="en-US" sz="1400" dirty="0">
+              <a:latin typeface="Helvetica Neue"/>
+            </a:endParaRPr>
+          </a:p>
+          <a:p>
+            <a:pPr algn="just"/>
+            <a:r>
+              <a:rPr lang="en-US" sz="1400" dirty="0">
+                <a:latin typeface="Helvetica Neue"/>
+              </a:rPr>
+              <a:t>15. </a:t>
+            </a:r>
+            <a:r>
+              <a:rPr lang="en-US" sz="1400" dirty="0" err="1">
+                <a:latin typeface="Helvetica Neue"/>
+              </a:rPr>
+              <a:t>info_property_id</a:t>
+            </a:r>
+            <a:r>
+              <a:rPr lang="en-US" sz="1400" dirty="0">
+                <a:latin typeface="Helvetica Neue"/>
+              </a:rPr>
+              <a:t>: id </a:t>
+            </a:r>
+            <a:r>
+              <a:rPr lang="en-US" sz="1400" dirty="0" err="1">
+                <a:latin typeface="Helvetica Neue"/>
+              </a:rPr>
+              <a:t>căn</a:t>
+            </a:r>
+            <a:r>
+              <a:rPr lang="en-US" sz="1400" dirty="0">
+                <a:latin typeface="Helvetica Neue"/>
+              </a:rPr>
+              <a:t> </a:t>
+            </a:r>
+            <a:r>
+              <a:rPr lang="en-US" sz="1400" dirty="0" err="1">
+                <a:latin typeface="Helvetica Neue"/>
+              </a:rPr>
+              <a:t>nhà</a:t>
+            </a:r>
+            <a:r>
+              <a:rPr lang="en-US" sz="1400" dirty="0">
+                <a:latin typeface="Helvetica Neue"/>
+              </a:rPr>
+              <a:t>.</a:t>
+            </a:r>
+            <a:endParaRPr lang="vi-VN" sz="1400" dirty="0">
+              <a:latin typeface="Helvetica Neue"/>
+            </a:endParaRPr>
+          </a:p>
+          <a:p>
+            <a:pPr algn="just"/>
+            <a:r>
+              <a:rPr lang="en-US" sz="1400" dirty="0">
+                <a:latin typeface="Helvetica Neue"/>
+              </a:rPr>
+              <a:t>16. </a:t>
+            </a:r>
+            <a:r>
+              <a:rPr lang="en-US" sz="1400" dirty="0" err="1">
+                <a:latin typeface="Helvetica Neue"/>
+              </a:rPr>
+              <a:t>i</a:t>
+            </a:r>
+            <a:r>
+              <a:rPr lang="vi-VN" sz="1400" dirty="0">
+                <a:latin typeface="Helvetica Neue"/>
+              </a:rPr>
+              <a:t>nfo_county: tên quận.</a:t>
+            </a:r>
+          </a:p>
+          <a:p>
+            <a:pPr algn="just"/>
+            <a:r>
+              <a:rPr lang="en-US" sz="1400" dirty="0">
+                <a:latin typeface="Helvetica Neue"/>
+              </a:rPr>
+              <a:t>17. </a:t>
+            </a:r>
+            <a:r>
+              <a:rPr lang="vi-VN" sz="1400" dirty="0">
+                <a:latin typeface="Helvetica Neue"/>
+              </a:rPr>
+              <a:t>info_parcel_number: số bưu kiện.</a:t>
             </a:r>
           </a:p>
         </p:txBody>
       </p:sp>
-      <p:pic>
-        <p:nvPicPr>
-          <p:cNvPr id="4" name="Picture 3">
-            <a:extLst>
-              <a:ext uri="{FF2B5EF4-FFF2-40B4-BE49-F238E27FC236}">
-                <a16:creationId xmlns:a16="http://schemas.microsoft.com/office/drawing/2014/main" id="{A5610616-7FB4-4A7B-8FB2-E2CEA38B3B91}"/>
-              </a:ext>
-            </a:extLst>
-          </p:cNvPr>
-          <p:cNvPicPr>
-            <a:picLocks noChangeAspect="1"/>
-          </p:cNvPicPr>
-          <p:nvPr/>
-        </p:nvPicPr>
-        <p:blipFill>
-          <a:blip r:embed="rId3"/>
-          <a:stretch>
-            <a:fillRect/>
-          </a:stretch>
-        </p:blipFill>
-        <p:spPr>
-          <a:xfrm>
-            <a:off x="469220" y="852850"/>
-            <a:ext cx="3727450" cy="985838"/>
-          </a:xfrm>
-          <a:prstGeom prst="rect">
-            <a:avLst/>
-          </a:prstGeom>
-        </p:spPr>
-      </p:pic>
-      <p:sp>
-        <p:nvSpPr>
-          <p:cNvPr id="14" name="Slide Number Placeholder 13">
-            <a:extLst>
-              <a:ext uri="{FF2B5EF4-FFF2-40B4-BE49-F238E27FC236}">
-                <a16:creationId xmlns:a16="http://schemas.microsoft.com/office/drawing/2014/main" id="{980EF428-8355-4A47-B751-792490A6FC45}"/>
-              </a:ext>
-            </a:extLst>
-          </p:cNvPr>
-          <p:cNvSpPr>
-            <a:spLocks noGrp="1"/>
-          </p:cNvSpPr>
-          <p:nvPr>
-            <p:ph type="sldNum" sz="quarter" idx="12"/>
-          </p:nvPr>
-        </p:nvSpPr>
-        <p:spPr/>
-        <p:txBody>
-          <a:bodyPr/>
-          <a:lstStyle/>
-          <a:p>
-            <a:fld id="{D57F1E4F-1CFF-5643-939E-217C01CDF565}" type="slidenum">
-              <a:rPr lang="en-US" smtClean="0"/>
-              <a:pPr/>
-              <a:t>10</a:t>
-            </a:fld>
-            <a:endParaRPr lang="en-US" dirty="0"/>
-          </a:p>
-        </p:txBody>
-      </p:sp>
-      <p:sp>
-        <p:nvSpPr>
-          <p:cNvPr id="16" name="Rectangle 15">
-            <a:extLst>
-              <a:ext uri="{FF2B5EF4-FFF2-40B4-BE49-F238E27FC236}">
-                <a16:creationId xmlns:a16="http://schemas.microsoft.com/office/drawing/2014/main" id="{C7573E04-BA66-4F2F-8BB1-4E163472AF88}"/>
-              </a:ext>
-            </a:extLst>
-          </p:cNvPr>
-          <p:cNvSpPr/>
-          <p:nvPr/>
-        </p:nvSpPr>
-        <p:spPr>
-          <a:xfrm>
-            <a:off x="631452" y="2622002"/>
-            <a:ext cx="10992621" cy="369332"/>
-          </a:xfrm>
-          <a:prstGeom prst="rect">
-            <a:avLst/>
-          </a:prstGeom>
-        </p:spPr>
-        <p:txBody>
-          <a:bodyPr wrap="square">
-            <a:spAutoFit/>
-          </a:bodyPr>
-          <a:lstStyle/>
-          <a:p>
-            <a:pPr algn="just"/>
-            <a:r>
-              <a:rPr lang="en-US" dirty="0" err="1">
-                <a:latin typeface="Helvetica Neue"/>
-              </a:rPr>
-              <a:t>Tiến</a:t>
-            </a:r>
-            <a:r>
-              <a:rPr lang="en-US" dirty="0">
-                <a:latin typeface="Helvetica Neue"/>
-              </a:rPr>
-              <a:t> </a:t>
-            </a:r>
-            <a:r>
-              <a:rPr lang="en-US" dirty="0" err="1">
-                <a:latin typeface="Helvetica Neue"/>
-              </a:rPr>
-              <a:t>hành</a:t>
-            </a:r>
-            <a:r>
-              <a:rPr lang="en-US" dirty="0">
-                <a:latin typeface="Helvetica Neue"/>
-              </a:rPr>
-              <a:t> </a:t>
-            </a:r>
-            <a:r>
-              <a:rPr lang="en-US" dirty="0" err="1">
-                <a:latin typeface="Helvetica Neue"/>
-              </a:rPr>
-              <a:t>lấy</a:t>
-            </a:r>
-            <a:r>
-              <a:rPr lang="en-US" dirty="0">
-                <a:latin typeface="Helvetica Neue"/>
-              </a:rPr>
-              <a:t> </a:t>
-            </a:r>
-            <a:r>
-              <a:rPr lang="en-US" dirty="0" err="1">
-                <a:latin typeface="Helvetica Neue"/>
-              </a:rPr>
-              <a:t>các</a:t>
-            </a:r>
-            <a:r>
-              <a:rPr lang="en-US" dirty="0">
-                <a:latin typeface="Helvetica Neue"/>
-              </a:rPr>
-              <a:t> </a:t>
-            </a:r>
-            <a:r>
-              <a:rPr lang="en-US" dirty="0" err="1">
-                <a:latin typeface="Helvetica Neue"/>
-              </a:rPr>
-              <a:t>thông</a:t>
-            </a:r>
-            <a:r>
-              <a:rPr lang="en-US" dirty="0">
-                <a:latin typeface="Helvetica Neue"/>
-              </a:rPr>
-              <a:t> tin </a:t>
-            </a:r>
-            <a:r>
-              <a:rPr lang="en-US" dirty="0" err="1">
-                <a:latin typeface="Helvetica Neue"/>
-              </a:rPr>
-              <a:t>cần</a:t>
-            </a:r>
-            <a:r>
-              <a:rPr lang="en-US" dirty="0">
-                <a:latin typeface="Helvetica Neue"/>
-              </a:rPr>
-              <a:t> </a:t>
-            </a:r>
-            <a:r>
-              <a:rPr lang="en-US" dirty="0" err="1">
-                <a:latin typeface="Helvetica Neue"/>
-              </a:rPr>
-              <a:t>quan</a:t>
-            </a:r>
-            <a:r>
-              <a:rPr lang="en-US" dirty="0">
-                <a:latin typeface="Helvetica Neue"/>
-              </a:rPr>
-              <a:t> </a:t>
-            </a:r>
-            <a:r>
-              <a:rPr lang="en-US" dirty="0" err="1">
-                <a:latin typeface="Helvetica Neue"/>
-              </a:rPr>
-              <a:t>tâm</a:t>
-            </a:r>
-            <a:r>
-              <a:rPr lang="en-US" dirty="0">
-                <a:latin typeface="Helvetica Neue"/>
-              </a:rPr>
-              <a:t> </a:t>
-            </a:r>
-            <a:r>
-              <a:rPr lang="en-US" dirty="0" err="1">
-                <a:latin typeface="Helvetica Neue"/>
-              </a:rPr>
-              <a:t>từ</a:t>
-            </a:r>
-            <a:r>
-              <a:rPr lang="en-US" dirty="0">
-                <a:latin typeface="Helvetica Neue"/>
-              </a:rPr>
-              <a:t> </a:t>
-            </a:r>
-            <a:r>
-              <a:rPr lang="en-US" dirty="0">
-                <a:solidFill>
-                  <a:srgbClr val="00B050"/>
-                </a:solidFill>
-                <a:latin typeface="Helvetica Neue"/>
-              </a:rPr>
-              <a:t>19957 </a:t>
-            </a:r>
-            <a:r>
-              <a:rPr lang="en-US" dirty="0" err="1">
-                <a:solidFill>
-                  <a:srgbClr val="00B050"/>
-                </a:solidFill>
-                <a:latin typeface="Helvetica Neue"/>
-              </a:rPr>
-              <a:t>bản</a:t>
-            </a:r>
-            <a:r>
-              <a:rPr lang="en-US" dirty="0">
-                <a:solidFill>
-                  <a:srgbClr val="00B050"/>
-                </a:solidFill>
-                <a:latin typeface="Helvetica Neue"/>
-              </a:rPr>
-              <a:t> tin </a:t>
-            </a:r>
-            <a:r>
-              <a:rPr lang="en-US" dirty="0" err="1">
-                <a:latin typeface="Helvetica Neue"/>
-              </a:rPr>
-              <a:t>thu</a:t>
-            </a:r>
-            <a:r>
-              <a:rPr lang="en-US" dirty="0">
-                <a:latin typeface="Helvetica Neue"/>
-              </a:rPr>
-              <a:t> đ</a:t>
-            </a:r>
-            <a:r>
-              <a:rPr lang="vi-VN" dirty="0">
-                <a:latin typeface="Helvetica Neue"/>
-              </a:rPr>
-              <a:t>ư</a:t>
-            </a:r>
-            <a:r>
-              <a:rPr lang="en-US" dirty="0" err="1">
-                <a:latin typeface="Helvetica Neue"/>
-              </a:rPr>
-              <a:t>ợc</a:t>
-            </a:r>
-            <a:r>
-              <a:rPr lang="en-US" dirty="0">
-                <a:latin typeface="Helvetica Neue"/>
-              </a:rPr>
-              <a:t> </a:t>
-            </a:r>
-            <a:r>
-              <a:rPr lang="en-US" dirty="0" err="1">
-                <a:latin typeface="Helvetica Neue"/>
-              </a:rPr>
-              <a:t>dữ</a:t>
-            </a:r>
-            <a:r>
-              <a:rPr lang="en-US" dirty="0">
-                <a:latin typeface="Helvetica Neue"/>
-              </a:rPr>
-              <a:t> </a:t>
-            </a:r>
-            <a:r>
-              <a:rPr lang="en-US" dirty="0" err="1">
-                <a:latin typeface="Helvetica Neue"/>
-              </a:rPr>
-              <a:t>liệu</a:t>
-            </a:r>
-            <a:r>
-              <a:rPr lang="en-US" dirty="0">
-                <a:latin typeface="Helvetica Neue"/>
-              </a:rPr>
-              <a:t> </a:t>
-            </a:r>
-            <a:r>
-              <a:rPr lang="en-US" dirty="0" err="1">
-                <a:latin typeface="Helvetica Neue"/>
-              </a:rPr>
-              <a:t>có</a:t>
-            </a:r>
-            <a:r>
-              <a:rPr lang="en-US" dirty="0">
-                <a:latin typeface="Helvetica Neue"/>
-              </a:rPr>
-              <a:t> </a:t>
-            </a:r>
-            <a:r>
-              <a:rPr lang="en-US" dirty="0" err="1">
-                <a:latin typeface="Helvetica Neue"/>
-              </a:rPr>
-              <a:t>dạng</a:t>
-            </a:r>
-            <a:r>
-              <a:rPr lang="en-US" dirty="0">
-                <a:latin typeface="Helvetica Neue"/>
-              </a:rPr>
-              <a:t> </a:t>
-            </a:r>
-            <a:r>
-              <a:rPr lang="en-US" dirty="0" err="1">
-                <a:latin typeface="Helvetica Neue"/>
-              </a:rPr>
-              <a:t>nh</a:t>
-            </a:r>
-            <a:r>
-              <a:rPr lang="vi-VN" dirty="0">
-                <a:latin typeface="Helvetica Neue"/>
-              </a:rPr>
-              <a:t>ư</a:t>
-            </a:r>
-            <a:r>
-              <a:rPr lang="en-US" dirty="0">
-                <a:latin typeface="Helvetica Neue"/>
-              </a:rPr>
-              <a:t> </a:t>
-            </a:r>
-            <a:r>
-              <a:rPr lang="en-US" dirty="0" err="1">
-                <a:latin typeface="Helvetica Neue"/>
-              </a:rPr>
-              <a:t>sau</a:t>
-            </a:r>
-            <a:r>
-              <a:rPr lang="en-US" dirty="0">
-                <a:latin typeface="Helvetica Neue"/>
-              </a:rPr>
-              <a:t>:</a:t>
-            </a:r>
-          </a:p>
-        </p:txBody>
-      </p:sp>
-      <p:pic>
-        <p:nvPicPr>
-          <p:cNvPr id="17" name="Picture 16">
-            <a:extLst>
-              <a:ext uri="{FF2B5EF4-FFF2-40B4-BE49-F238E27FC236}">
-                <a16:creationId xmlns:a16="http://schemas.microsoft.com/office/drawing/2014/main" id="{021566D3-228B-4BF6-B830-94136945CA90}"/>
-              </a:ext>
-            </a:extLst>
-          </p:cNvPr>
-          <p:cNvPicPr>
-            <a:picLocks noChangeAspect="1"/>
-          </p:cNvPicPr>
-          <p:nvPr/>
-        </p:nvPicPr>
-        <p:blipFill>
-          <a:blip r:embed="rId4"/>
-          <a:stretch>
-            <a:fillRect/>
-          </a:stretch>
-        </p:blipFill>
-        <p:spPr>
-          <a:xfrm>
-            <a:off x="614362" y="3214252"/>
-            <a:ext cx="10963275" cy="1885950"/>
-          </a:xfrm>
-          <a:prstGeom prst="rect">
-            <a:avLst/>
-          </a:prstGeom>
-        </p:spPr>
-      </p:pic>
-    </p:spTree>
-    <p:extLst>
-      <p:ext uri="{BB962C8B-B14F-4D97-AF65-F5344CB8AC3E}">
-        <p14:creationId xmlns:p14="http://schemas.microsoft.com/office/powerpoint/2010/main" val="766188317"/>
-      </p:ext>
-    </p:extLst>
-  </p:cSld>
-  <p:clrMapOvr>
-    <a:masterClrMapping/>
-  </p:clrMapOvr>
-</p:sld>
-</file>
-
-<file path=ppt/slides/slide11.xml><?xml version="1.0" encoding="utf-8"?>
-<p:sld xmlns:a="http://schemas.openxmlformats.org/drawingml/2006/main" xmlns:r="http://schemas.openxmlformats.org/officeDocument/2006/relationships" xmlns:p="http://schemas.openxmlformats.org/presentationml/2006/main" show="0">
-  <p:cSld>
-    <p:spTree>
-      <p:nvGrpSpPr>
-        <p:cNvPr id="1" name=""/>
-        <p:cNvGrpSpPr/>
-        <p:nvPr/>
-      </p:nvGrpSpPr>
-      <p:grpSpPr>
-        <a:xfrm>
-          <a:off x="0" y="0"/>
-          <a:ext cx="0" cy="0"/>
-          <a:chOff x="0" y="0"/>
-          <a:chExt cx="0" cy="0"/>
-        </a:xfrm>
-      </p:grpSpPr>
-      <p:sp>
-        <p:nvSpPr>
-          <p:cNvPr id="5" name="Title 3">
-            <a:extLst>
-              <a:ext uri="{FF2B5EF4-FFF2-40B4-BE49-F238E27FC236}">
-                <a16:creationId xmlns:a16="http://schemas.microsoft.com/office/drawing/2014/main" id="{19108840-FFCC-42C7-88AD-7039908F3F4D}"/>
-              </a:ext>
-            </a:extLst>
-          </p:cNvPr>
-          <p:cNvSpPr>
-            <a:spLocks noGrp="1"/>
-          </p:cNvSpPr>
-          <p:nvPr>
-            <p:ph type="title"/>
-          </p:nvPr>
-        </p:nvSpPr>
-        <p:spPr>
-          <a:xfrm>
-            <a:off x="4475748" y="5474331"/>
-            <a:ext cx="6944216" cy="689514"/>
-          </a:xfrm>
-        </p:spPr>
-        <p:txBody>
-          <a:bodyPr>
-            <a:noAutofit/>
-          </a:bodyPr>
-          <a:lstStyle/>
-          <a:p>
-            <a:pPr algn="r"/>
-            <a:r>
-              <a:rPr lang="en-US" sz="2400" b="1" dirty="0">
-                <a:solidFill>
-                  <a:schemeClr val="bg1"/>
-                </a:solidFill>
-                <a:latin typeface="Calibri (Body)"/>
-              </a:rPr>
-              <a:t>THU THẬP DỮ LIỆU – THÔNG TIN DỮ LIỆU LẤY Đ</a:t>
-            </a:r>
-            <a:r>
-              <a:rPr lang="vi-VN" sz="2400" b="1" dirty="0">
-                <a:solidFill>
-                  <a:schemeClr val="bg1"/>
-                </a:solidFill>
-                <a:latin typeface="Calibri (Body)"/>
-              </a:rPr>
-              <a:t>Ư</a:t>
-            </a:r>
-            <a:r>
-              <a:rPr lang="en-US" sz="2400" b="1" dirty="0">
-                <a:solidFill>
-                  <a:schemeClr val="bg1"/>
-                </a:solidFill>
-                <a:latin typeface="Calibri (Body)"/>
-              </a:rPr>
-              <a:t>ỢC</a:t>
-            </a:r>
-          </a:p>
-        </p:txBody>
-      </p:sp>
-      <mc:AlternateContent xmlns:mc="http://schemas.openxmlformats.org/markup-compatibility/2006" xmlns:a14="http://schemas.microsoft.com/office/drawing/2010/main">
-        <mc:Choice Requires="a14">
-          <p:sp>
-            <p:nvSpPr>
-              <p:cNvPr id="8" name="Rectangle 7">
-                <a:extLst>
-                  <a:ext uri="{FF2B5EF4-FFF2-40B4-BE49-F238E27FC236}">
-                    <a16:creationId xmlns:a16="http://schemas.microsoft.com/office/drawing/2014/main" id="{A70019AA-1DDD-43D1-A944-F1E48142597A}"/>
-                  </a:ext>
-                </a:extLst>
-              </p:cNvPr>
-              <p:cNvSpPr/>
-              <p:nvPr/>
-            </p:nvSpPr>
-            <p:spPr>
-              <a:xfrm>
-                <a:off x="438151" y="905171"/>
-                <a:ext cx="3289787" cy="2345963"/>
-              </a:xfrm>
-              <a:prstGeom prst="rect">
-                <a:avLst/>
-              </a:prstGeom>
-              <a:ln w="28575">
-                <a:solidFill>
-                  <a:srgbClr val="0070C0"/>
-                </a:solidFill>
-              </a:ln>
-            </p:spPr>
-            <p:txBody>
-              <a:bodyPr wrap="square">
-                <a:spAutoFit/>
-              </a:bodyPr>
-              <a:lstStyle/>
-              <a:p>
-                <a:pPr algn="just"/>
-                <a:r>
-                  <a:rPr lang="en-US" sz="1600" dirty="0">
-                    <a:latin typeface="Helvetica Neue"/>
-                  </a:rPr>
-                  <a:t>1. are: </a:t>
-                </a:r>
-                <a:r>
-                  <a:rPr lang="en-US" sz="1600" dirty="0" err="1">
-                    <a:latin typeface="Helvetica Neue"/>
-                  </a:rPr>
-                  <a:t>diện</a:t>
-                </a:r>
-                <a:r>
-                  <a:rPr lang="en-US" sz="1600" dirty="0">
-                    <a:latin typeface="Helvetica Neue"/>
-                  </a:rPr>
-                  <a:t> </a:t>
-                </a:r>
-                <a:r>
-                  <a:rPr lang="en-US" sz="1600" dirty="0" err="1">
-                    <a:latin typeface="Helvetica Neue"/>
-                  </a:rPr>
-                  <a:t>tích</a:t>
-                </a:r>
-                <a:r>
-                  <a:rPr lang="en-US" sz="1600" dirty="0">
-                    <a:latin typeface="Helvetica Neue"/>
-                  </a:rPr>
-                  <a:t> </a:t>
-                </a:r>
-                <a:r>
-                  <a:rPr lang="en-US" sz="1600" dirty="0" err="1">
-                    <a:latin typeface="Helvetica Neue"/>
-                  </a:rPr>
-                  <a:t>nhà</a:t>
-                </a:r>
-                <a:r>
-                  <a:rPr lang="en-US" sz="1600" dirty="0">
-                    <a:latin typeface="Helvetica Neue"/>
-                  </a:rPr>
-                  <a:t> (</a:t>
-                </a:r>
-                <a14:m>
-                  <m:oMath xmlns:m="http://schemas.openxmlformats.org/officeDocument/2006/math">
-                    <m:sSup>
-                      <m:sSupPr>
-                        <m:ctrlPr>
-                          <a:rPr lang="en-US" sz="1600" i="1" smtClean="0">
-                            <a:latin typeface="Cambria Math" panose="02040503050406030204" pitchFamily="18" charset="0"/>
-                          </a:rPr>
-                        </m:ctrlPr>
-                      </m:sSupPr>
-                      <m:e>
-                        <m:r>
-                          <a:rPr lang="en-US" sz="1600" b="0" i="1" smtClean="0">
-                            <a:latin typeface="Cambria Math" panose="02040503050406030204" pitchFamily="18" charset="0"/>
-                          </a:rPr>
-                          <m:t>𝑚</m:t>
-                        </m:r>
-                      </m:e>
-                      <m:sup>
-                        <m:r>
-                          <a:rPr lang="en-US" sz="1600" i="1" smtClean="0">
-                            <a:latin typeface="Cambria Math" panose="02040503050406030204" pitchFamily="18" charset="0"/>
-                          </a:rPr>
-                          <m:t>2</m:t>
-                        </m:r>
-                      </m:sup>
-                    </m:sSup>
-                  </m:oMath>
-                </a14:m>
-                <a:r>
-                  <a:rPr lang="en-US" sz="1600" dirty="0">
-                    <a:latin typeface="Helvetica Neue"/>
-                  </a:rPr>
-                  <a:t>)</a:t>
-                </a:r>
-              </a:p>
-              <a:p>
-                <a:pPr algn="just"/>
-                <a:r>
-                  <a:rPr lang="en-US" sz="1600" dirty="0">
-                    <a:latin typeface="Helvetica Neue"/>
-                  </a:rPr>
-                  <a:t>2. district: </a:t>
-                </a:r>
-                <a:r>
-                  <a:rPr lang="en-US" sz="1600" dirty="0" err="1">
-                    <a:latin typeface="Helvetica Neue"/>
-                  </a:rPr>
-                  <a:t>quận</a:t>
-                </a:r>
-                <a:r>
-                  <a:rPr lang="en-US" sz="1600" dirty="0">
-                    <a:latin typeface="Helvetica Neue"/>
-                  </a:rPr>
-                  <a:t>/</a:t>
-                </a:r>
-                <a:r>
-                  <a:rPr lang="en-US" sz="1600" dirty="0" err="1">
-                    <a:latin typeface="Helvetica Neue"/>
-                  </a:rPr>
-                  <a:t>huyện</a:t>
-                </a:r>
-                <a:r>
-                  <a:rPr lang="en-US" sz="1600" dirty="0">
-                    <a:latin typeface="Helvetica Neue"/>
-                  </a:rPr>
-                  <a:t>.</a:t>
-                </a:r>
-              </a:p>
-              <a:p>
-                <a:pPr algn="just"/>
-                <a:r>
-                  <a:rPr lang="en-US" sz="1600" dirty="0">
-                    <a:latin typeface="Helvetica Neue"/>
-                  </a:rPr>
-                  <a:t>3. address: </a:t>
-                </a:r>
-                <a:r>
-                  <a:rPr lang="en-US" sz="1600" dirty="0" err="1">
-                    <a:latin typeface="Helvetica Neue"/>
-                  </a:rPr>
-                  <a:t>địa</a:t>
-                </a:r>
-                <a:r>
-                  <a:rPr lang="en-US" sz="1600" dirty="0">
-                    <a:latin typeface="Helvetica Neue"/>
-                  </a:rPr>
-                  <a:t> </a:t>
-                </a:r>
-                <a:r>
-                  <a:rPr lang="en-US" sz="1600" dirty="0" err="1">
-                    <a:latin typeface="Helvetica Neue"/>
-                  </a:rPr>
-                  <a:t>chỉ</a:t>
-                </a:r>
-                <a:r>
-                  <a:rPr lang="en-US" sz="1600" dirty="0">
-                    <a:latin typeface="Helvetica Neue"/>
-                  </a:rPr>
-                  <a:t> </a:t>
-                </a:r>
-                <a:r>
-                  <a:rPr lang="en-US" sz="1600" dirty="0" err="1">
-                    <a:latin typeface="Helvetica Neue"/>
-                  </a:rPr>
-                  <a:t>nhà</a:t>
-                </a:r>
-                <a:r>
-                  <a:rPr lang="en-US" sz="1600" dirty="0">
-                    <a:latin typeface="Helvetica Neue"/>
-                  </a:rPr>
-                  <a:t>.</a:t>
-                </a:r>
-              </a:p>
-              <a:p>
-                <a:pPr algn="just"/>
-                <a:r>
-                  <a:rPr lang="en-US" sz="1600" dirty="0">
-                    <a:latin typeface="Helvetica Neue"/>
-                  </a:rPr>
-                  <a:t>4. floors: </a:t>
-                </a:r>
-                <a:r>
-                  <a:rPr lang="en-US" sz="1600" dirty="0" err="1">
-                    <a:latin typeface="Helvetica Neue"/>
-                  </a:rPr>
-                  <a:t>số</a:t>
-                </a:r>
-                <a:r>
-                  <a:rPr lang="en-US" sz="1600" dirty="0">
-                    <a:latin typeface="Helvetica Neue"/>
-                  </a:rPr>
-                  <a:t> l</a:t>
-                </a:r>
-                <a:r>
-                  <a:rPr lang="vi-VN" sz="1600" dirty="0">
-                    <a:latin typeface="Helvetica Neue"/>
-                  </a:rPr>
-                  <a:t>ư</a:t>
-                </a:r>
-                <a:r>
-                  <a:rPr lang="en-US" sz="1600" dirty="0" err="1">
-                    <a:latin typeface="Helvetica Neue"/>
-                  </a:rPr>
-                  <a:t>ợng</a:t>
-                </a:r>
-                <a:r>
-                  <a:rPr lang="en-US" sz="1600" dirty="0">
-                    <a:latin typeface="Helvetica Neue"/>
-                  </a:rPr>
-                  <a:t> </a:t>
-                </a:r>
-                <a:r>
-                  <a:rPr lang="en-US" sz="1600" dirty="0" err="1">
-                    <a:latin typeface="Helvetica Neue"/>
-                  </a:rPr>
-                  <a:t>tầng</a:t>
-                </a:r>
-                <a:r>
-                  <a:rPr lang="en-US" sz="1600" dirty="0">
-                    <a:latin typeface="Helvetica Neue"/>
-                  </a:rPr>
-                  <a:t>.</a:t>
-                </a:r>
-              </a:p>
-              <a:p>
-                <a:pPr algn="just"/>
-                <a:r>
-                  <a:rPr lang="en-US" sz="1600" dirty="0">
-                    <a:latin typeface="Helvetica Neue"/>
-                  </a:rPr>
-                  <a:t>5. </a:t>
-                </a:r>
-                <a:r>
-                  <a:rPr lang="en-US" sz="1600" dirty="0" err="1">
-                    <a:latin typeface="Helvetica Neue"/>
-                  </a:rPr>
-                  <a:t>bedroms</a:t>
-                </a:r>
-                <a:r>
-                  <a:rPr lang="en-US" sz="1600" dirty="0">
-                    <a:latin typeface="Helvetica Neue"/>
-                  </a:rPr>
-                  <a:t>: </a:t>
-                </a:r>
-                <a:r>
-                  <a:rPr lang="en-US" sz="1600" dirty="0" err="1">
-                    <a:latin typeface="Helvetica Neue"/>
-                  </a:rPr>
-                  <a:t>số</a:t>
-                </a:r>
-                <a:r>
-                  <a:rPr lang="en-US" sz="1600" dirty="0">
-                    <a:latin typeface="Helvetica Neue"/>
-                  </a:rPr>
-                  <a:t> l</a:t>
-                </a:r>
-                <a:r>
-                  <a:rPr lang="vi-VN" sz="1600" dirty="0">
-                    <a:latin typeface="Helvetica Neue"/>
-                  </a:rPr>
-                  <a:t>ư</a:t>
-                </a:r>
-                <a:r>
-                  <a:rPr lang="en-US" sz="1600" dirty="0" err="1">
-                    <a:latin typeface="Helvetica Neue"/>
-                  </a:rPr>
-                  <a:t>ợng</a:t>
-                </a:r>
-                <a:r>
-                  <a:rPr lang="en-US" sz="1600" dirty="0">
-                    <a:latin typeface="Helvetica Neue"/>
-                  </a:rPr>
-                  <a:t> </a:t>
-                </a:r>
-                <a:r>
-                  <a:rPr lang="en-US" sz="1600" dirty="0" err="1">
-                    <a:latin typeface="Helvetica Neue"/>
-                  </a:rPr>
-                  <a:t>phòng</a:t>
-                </a:r>
-                <a:r>
-                  <a:rPr lang="en-US" sz="1600" dirty="0">
-                    <a:latin typeface="Helvetica Neue"/>
-                  </a:rPr>
-                  <a:t> </a:t>
-                </a:r>
-                <a:r>
-                  <a:rPr lang="en-US" sz="1600" dirty="0" err="1">
-                    <a:latin typeface="Helvetica Neue"/>
-                  </a:rPr>
-                  <a:t>ngủ</a:t>
-                </a:r>
-                <a:r>
-                  <a:rPr lang="en-US" sz="1600" dirty="0">
-                    <a:latin typeface="Helvetica Neue"/>
-                  </a:rPr>
-                  <a:t>.</a:t>
-                </a:r>
-              </a:p>
-              <a:p>
-                <a:pPr algn="just"/>
-                <a:r>
-                  <a:rPr lang="en-US" sz="1600" dirty="0">
-                    <a:latin typeface="Helvetica Neue"/>
-                  </a:rPr>
-                  <a:t>6. toilets: </a:t>
-                </a:r>
-                <a:r>
-                  <a:rPr lang="en-US" sz="1600" dirty="0" err="1">
-                    <a:latin typeface="Helvetica Neue"/>
-                  </a:rPr>
-                  <a:t>số</a:t>
-                </a:r>
-                <a:r>
-                  <a:rPr lang="en-US" sz="1600" dirty="0">
-                    <a:latin typeface="Helvetica Neue"/>
-                  </a:rPr>
-                  <a:t> l</a:t>
-                </a:r>
-                <a:r>
-                  <a:rPr lang="vi-VN" sz="1600" dirty="0">
-                    <a:latin typeface="Helvetica Neue"/>
-                  </a:rPr>
-                  <a:t>ư</a:t>
-                </a:r>
-                <a:r>
-                  <a:rPr lang="en-US" sz="1600" dirty="0" err="1">
-                    <a:latin typeface="Helvetica Neue"/>
-                  </a:rPr>
-                  <a:t>ợng</a:t>
-                </a:r>
-                <a:r>
-                  <a:rPr lang="en-US" sz="1600" dirty="0">
-                    <a:latin typeface="Helvetica Neue"/>
-                  </a:rPr>
-                  <a:t> toilet.</a:t>
-                </a:r>
-              </a:p>
-              <a:p>
-                <a:pPr algn="just"/>
-                <a:r>
-                  <a:rPr lang="en-US" sz="1600" dirty="0">
-                    <a:latin typeface="Helvetica Neue"/>
-                  </a:rPr>
-                  <a:t>7. front: </a:t>
-                </a:r>
-                <a:r>
-                  <a:rPr lang="en-US" sz="1600" dirty="0" err="1">
-                    <a:latin typeface="Helvetica Neue"/>
-                  </a:rPr>
-                  <a:t>mặt</a:t>
-                </a:r>
-                <a:r>
-                  <a:rPr lang="en-US" sz="1600" dirty="0">
-                    <a:latin typeface="Helvetica Neue"/>
-                  </a:rPr>
-                  <a:t> </a:t>
-                </a:r>
-                <a:r>
-                  <a:rPr lang="en-US" sz="1600" dirty="0" err="1">
-                    <a:latin typeface="Helvetica Neue"/>
-                  </a:rPr>
-                  <a:t>tiền</a:t>
-                </a:r>
-                <a:r>
-                  <a:rPr lang="en-US" sz="1600" dirty="0">
-                    <a:latin typeface="Helvetica Neue"/>
-                  </a:rPr>
-                  <a:t> </a:t>
-                </a:r>
-                <a:r>
-                  <a:rPr lang="en-US" sz="1600" dirty="0" err="1">
-                    <a:latin typeface="Helvetica Neue"/>
-                  </a:rPr>
-                  <a:t>của</a:t>
-                </a:r>
-                <a:r>
-                  <a:rPr lang="en-US" sz="1600" dirty="0">
-                    <a:latin typeface="Helvetica Neue"/>
-                  </a:rPr>
-                  <a:t> </a:t>
-                </a:r>
-                <a:r>
-                  <a:rPr lang="en-US" sz="1600" dirty="0" err="1">
-                    <a:latin typeface="Helvetica Neue"/>
-                  </a:rPr>
-                  <a:t>nhà</a:t>
-                </a:r>
-                <a:r>
-                  <a:rPr lang="en-US" sz="1600" dirty="0">
-                    <a:latin typeface="Helvetica Neue"/>
-                  </a:rPr>
-                  <a:t> (</a:t>
-                </a:r>
-                <a14:m>
-                  <m:oMath xmlns:m="http://schemas.openxmlformats.org/officeDocument/2006/math">
-                    <m:r>
-                      <a:rPr lang="en-US" sz="1600" i="1">
-                        <a:latin typeface="Cambria Math" panose="02040503050406030204" pitchFamily="18" charset="0"/>
-                      </a:rPr>
-                      <m:t>𝑚</m:t>
-                    </m:r>
-                  </m:oMath>
-                </a14:m>
-                <a:r>
-                  <a:rPr lang="en-US" sz="1600" dirty="0">
-                    <a:latin typeface="Helvetica Neue"/>
-                  </a:rPr>
-                  <a:t>).</a:t>
-                </a:r>
-              </a:p>
-              <a:p>
-                <a:pPr algn="just"/>
-                <a:r>
-                  <a:rPr lang="en-US" sz="1600" dirty="0">
-                    <a:latin typeface="Helvetica Neue"/>
-                  </a:rPr>
-                  <a:t>8. entrance: đ</a:t>
-                </a:r>
-                <a:r>
-                  <a:rPr lang="vi-VN" sz="1600" dirty="0">
-                    <a:latin typeface="Helvetica Neue"/>
-                  </a:rPr>
-                  <a:t>ư</a:t>
-                </a:r>
-                <a:r>
-                  <a:rPr lang="en-US" sz="1600" dirty="0" err="1">
-                    <a:latin typeface="Helvetica Neue"/>
-                  </a:rPr>
-                  <a:t>ờng</a:t>
-                </a:r>
-                <a:r>
-                  <a:rPr lang="en-US" sz="1600" dirty="0">
-                    <a:latin typeface="Helvetica Neue"/>
-                  </a:rPr>
-                  <a:t> </a:t>
-                </a:r>
-                <a:r>
-                  <a:rPr lang="en-US" sz="1600" dirty="0" err="1">
-                    <a:latin typeface="Helvetica Neue"/>
-                  </a:rPr>
-                  <a:t>vào</a:t>
-                </a:r>
-                <a:r>
-                  <a:rPr lang="en-US" sz="1600" dirty="0">
-                    <a:latin typeface="Helvetica Neue"/>
-                  </a:rPr>
-                  <a:t> </a:t>
-                </a:r>
-                <a:r>
-                  <a:rPr lang="en-US" sz="1600" dirty="0" err="1">
-                    <a:latin typeface="Helvetica Neue"/>
-                  </a:rPr>
-                  <a:t>nhà</a:t>
-                </a:r>
-                <a:r>
-                  <a:rPr lang="en-US" sz="1600" dirty="0">
-                    <a:latin typeface="Helvetica Neue"/>
-                  </a:rPr>
-                  <a:t> (</a:t>
-                </a:r>
-                <a14:m>
-                  <m:oMath xmlns:m="http://schemas.openxmlformats.org/officeDocument/2006/math">
-                    <m:r>
-                      <a:rPr lang="en-US" sz="1600" i="1">
-                        <a:latin typeface="Cambria Math" panose="02040503050406030204" pitchFamily="18" charset="0"/>
-                      </a:rPr>
-                      <m:t>𝑚</m:t>
-                    </m:r>
-                  </m:oMath>
-                </a14:m>
-                <a:r>
-                  <a:rPr lang="en-US" sz="1600" dirty="0">
-                    <a:latin typeface="Helvetica Neue"/>
-                  </a:rPr>
-                  <a:t>).</a:t>
-                </a:r>
-              </a:p>
-              <a:p>
-                <a:pPr algn="just"/>
-                <a:r>
-                  <a:rPr lang="en-US" sz="1600" dirty="0">
-                    <a:latin typeface="Helvetica Neue"/>
-                  </a:rPr>
-                  <a:t>9. </a:t>
-                </a:r>
-                <a:r>
-                  <a:rPr lang="en-US" sz="1600" dirty="0" err="1">
-                    <a:latin typeface="Helvetica Neue"/>
-                  </a:rPr>
-                  <a:t>house_aspect</a:t>
-                </a:r>
-                <a:r>
-                  <a:rPr lang="en-US" sz="1600" dirty="0">
-                    <a:latin typeface="Helvetica Neue"/>
-                  </a:rPr>
-                  <a:t>: h</a:t>
-                </a:r>
-                <a:r>
-                  <a:rPr lang="vi-VN" sz="1600" dirty="0">
-                    <a:latin typeface="Helvetica Neue"/>
-                  </a:rPr>
-                  <a:t>ư</a:t>
-                </a:r>
-                <a:r>
-                  <a:rPr lang="en-US" sz="1600" dirty="0" err="1">
-                    <a:latin typeface="Helvetica Neue"/>
-                  </a:rPr>
-                  <a:t>ớng</a:t>
-                </a:r>
-                <a:r>
-                  <a:rPr lang="en-US" sz="1600" dirty="0">
-                    <a:latin typeface="Helvetica Neue"/>
-                  </a:rPr>
-                  <a:t> </a:t>
-                </a:r>
-                <a:r>
-                  <a:rPr lang="en-US" sz="1600" dirty="0" err="1">
-                    <a:latin typeface="Helvetica Neue"/>
-                  </a:rPr>
-                  <a:t>nhà</a:t>
-                </a:r>
-                <a:r>
-                  <a:rPr lang="en-US" sz="1600" dirty="0">
-                    <a:latin typeface="Helvetica Neue"/>
-                  </a:rPr>
-                  <a:t>.</a:t>
-                </a:r>
-              </a:p>
-            </p:txBody>
-          </p:sp>
-        </mc:Choice>
-        <mc:Fallback xmlns="">
-          <p:sp>
-            <p:nvSpPr>
-              <p:cNvPr id="8" name="Rectangle 7">
-                <a:extLst>
-                  <a:ext uri="{FF2B5EF4-FFF2-40B4-BE49-F238E27FC236}">
-                    <a16:creationId xmlns:a16="http://schemas.microsoft.com/office/drawing/2014/main" id="{A70019AA-1DDD-43D1-A944-F1E48142597A}"/>
-                  </a:ext>
-                </a:extLst>
-              </p:cNvPr>
-              <p:cNvSpPr>
-                <a:spLocks noRot="1" noChangeAspect="1" noMove="1" noResize="1" noEditPoints="1" noAdjustHandles="1" noChangeArrowheads="1" noChangeShapeType="1" noTextEdit="1"/>
-              </p:cNvSpPr>
-              <p:nvPr/>
-            </p:nvSpPr>
-            <p:spPr>
-              <a:xfrm>
-                <a:off x="438151" y="905171"/>
-                <a:ext cx="3289787" cy="2345963"/>
-              </a:xfrm>
-              <a:prstGeom prst="rect">
-                <a:avLst/>
-              </a:prstGeom>
-              <a:blipFill>
-                <a:blip r:embed="rId2"/>
-                <a:stretch>
-                  <a:fillRect l="-734" t="-256"/>
-                </a:stretch>
-              </a:blipFill>
-              <a:ln w="28575">
-                <a:solidFill>
-                  <a:srgbClr val="0070C0"/>
-                </a:solidFill>
-              </a:ln>
-            </p:spPr>
-            <p:txBody>
-              <a:bodyPr/>
-              <a:lstStyle/>
-              <a:p>
-                <a:r>
-                  <a:rPr lang="en-US">
-                    <a:noFill/>
-                  </a:rPr>
-                  <a:t> </a:t>
-                </a:r>
-              </a:p>
-            </p:txBody>
-          </p:sp>
-        </mc:Fallback>
-      </mc:AlternateContent>
       <p:sp>
         <p:nvSpPr>
           <p:cNvPr id="9" name="Rectangle 8">
@@ -7406,8 +6379,8 @@
         </p:nvSpPr>
         <p:spPr>
           <a:xfrm>
-            <a:off x="8162342" y="3044467"/>
-            <a:ext cx="3687330" cy="2062103"/>
+            <a:off x="8242770" y="1829217"/>
+            <a:ext cx="3687330" cy="2893100"/>
           </a:xfrm>
           <a:prstGeom prst="rect">
             <a:avLst/>
@@ -7426,49 +6399,19 @@
           <a:p>
             <a:pPr algn="just"/>
             <a:r>
-              <a:rPr lang="en-US" sz="1600" dirty="0">
-                <a:latin typeface="Helvetica Neue"/>
-              </a:rPr>
-              <a:t>10. </a:t>
-            </a:r>
-            <a:r>
-              <a:rPr lang="en-US" sz="1600" dirty="0" err="1">
-                <a:latin typeface="Helvetica Neue"/>
-              </a:rPr>
-              <a:t>balcony_aspect</a:t>
-            </a:r>
-            <a:r>
-              <a:rPr lang="en-US" sz="1600" dirty="0">
-                <a:latin typeface="Helvetica Neue"/>
-              </a:rPr>
-              <a:t>: h</a:t>
-            </a:r>
-            <a:r>
-              <a:rPr lang="vi-VN" sz="1600" dirty="0">
-                <a:latin typeface="Helvetica Neue"/>
-              </a:rPr>
-              <a:t>ư</a:t>
-            </a:r>
-            <a:r>
-              <a:rPr lang="en-US" sz="1600" dirty="0" err="1">
-                <a:latin typeface="Helvetica Neue"/>
-              </a:rPr>
-              <a:t>ớng</a:t>
-            </a:r>
-            <a:r>
-              <a:rPr lang="en-US" sz="1600" dirty="0">
-                <a:latin typeface="Helvetica Neue"/>
-              </a:rPr>
-              <a:t> ban </a:t>
-            </a:r>
-            <a:r>
-              <a:rPr lang="en-US" sz="1600" dirty="0" err="1">
-                <a:latin typeface="Helvetica Neue"/>
-              </a:rPr>
-              <a:t>công</a:t>
-            </a:r>
-            <a:r>
-              <a:rPr lang="en-US" sz="1600" dirty="0">
+              <a:rPr lang="en-US" sz="1400" dirty="0">
+                <a:latin typeface="Helvetica Neue"/>
+              </a:rPr>
+              <a:t>18. </a:t>
+            </a:r>
+            <a:r>
+              <a:rPr lang="vi-VN" sz="1400" dirty="0">
+                <a:latin typeface="Helvetica Neue"/>
+              </a:rPr>
+              <a:t>axes_land: tiền đất.</a:t>
+            </a:r>
+            <a:r>
+              <a:rPr lang="en-US" sz="1400" dirty="0">
                 <a:latin typeface="Helvetica Neue"/>
               </a:rPr>
               <a:t>.</a:t>
@@ -7477,281 +6420,125 @@
           <a:p>
             <a:pPr algn="just"/>
             <a:r>
-              <a:rPr lang="en-US" sz="1600" dirty="0">
-                <a:latin typeface="Helvetica Neue"/>
-              </a:rPr>
-              <a:t>11. interior: </a:t>
-            </a:r>
-            <a:r>
-              <a:rPr lang="en-US" sz="1600" dirty="0" err="1">
-                <a:latin typeface="Helvetica Neue"/>
-              </a:rPr>
-              <a:t>nội</a:t>
-            </a:r>
-            <a:r>
-              <a:rPr lang="en-US" sz="1600" dirty="0">
-                <a:latin typeface="Helvetica Neue"/>
-              </a:rPr>
-              <a:t> </a:t>
-            </a:r>
-            <a:r>
-              <a:rPr lang="en-US" sz="1600" dirty="0" err="1">
-                <a:latin typeface="Helvetica Neue"/>
-              </a:rPr>
-              <a:t>thất</a:t>
-            </a:r>
-            <a:r>
-              <a:rPr lang="en-US" sz="1600" dirty="0">
-                <a:latin typeface="Helvetica Neue"/>
-              </a:rPr>
-              <a:t> </a:t>
-            </a:r>
-            <a:r>
-              <a:rPr lang="en-US" sz="1600" dirty="0" err="1">
-                <a:latin typeface="Helvetica Neue"/>
-              </a:rPr>
-              <a:t>nhà</a:t>
-            </a:r>
-            <a:r>
-              <a:rPr lang="en-US" sz="1600" dirty="0">
-                <a:latin typeface="Helvetica Neue"/>
-              </a:rPr>
-              <a:t> (1/0).</a:t>
+              <a:rPr lang="en-US" sz="1400" dirty="0">
+                <a:latin typeface="Helvetica Neue"/>
+              </a:rPr>
+              <a:t>19. </a:t>
+            </a:r>
+            <a:r>
+              <a:rPr lang="vi-VN" sz="1400" dirty="0">
+                <a:latin typeface="Helvetica Neue"/>
+              </a:rPr>
+              <a:t>taxes_improvements: tiền các cải tiến.</a:t>
             </a:r>
           </a:p>
           <a:p>
             <a:pPr algn="just"/>
             <a:r>
-              <a:rPr lang="en-US" sz="1600" dirty="0">
-                <a:latin typeface="Helvetica Neue"/>
-              </a:rPr>
-              <a:t>12. </a:t>
-            </a:r>
-            <a:r>
-              <a:rPr lang="en-US" sz="1600" dirty="0" err="1">
-                <a:latin typeface="Helvetica Neue"/>
-              </a:rPr>
-              <a:t>near_center</a:t>
-            </a:r>
-            <a:r>
-              <a:rPr lang="en-US" sz="1600" dirty="0">
-                <a:latin typeface="Helvetica Neue"/>
-              </a:rPr>
-              <a:t>: </a:t>
-            </a:r>
-            <a:r>
-              <a:rPr lang="en-US" sz="1600" dirty="0" err="1">
-                <a:latin typeface="Helvetica Neue"/>
-              </a:rPr>
-              <a:t>gần</a:t>
-            </a:r>
-            <a:r>
-              <a:rPr lang="en-US" sz="1600" dirty="0">
-                <a:latin typeface="Helvetica Neue"/>
-              </a:rPr>
-              <a:t> </a:t>
-            </a:r>
-            <a:r>
-              <a:rPr lang="en-US" sz="1600" dirty="0" err="1">
-                <a:latin typeface="Helvetica Neue"/>
-              </a:rPr>
-              <a:t>trung</a:t>
-            </a:r>
-            <a:r>
-              <a:rPr lang="en-US" sz="1600" dirty="0">
-                <a:latin typeface="Helvetica Neue"/>
-              </a:rPr>
-              <a:t> </a:t>
-            </a:r>
-            <a:r>
-              <a:rPr lang="en-US" sz="1600" dirty="0" err="1">
-                <a:latin typeface="Helvetica Neue"/>
-              </a:rPr>
-              <a:t>tâm</a:t>
-            </a:r>
-            <a:r>
-              <a:rPr lang="en-US" sz="1600" dirty="0">
-                <a:latin typeface="Helvetica Neue"/>
-              </a:rPr>
-              <a:t> (1/0).</a:t>
+              <a:rPr lang="en-US" sz="1400" dirty="0">
+                <a:latin typeface="Helvetica Neue"/>
+              </a:rPr>
+              <a:t>20. </a:t>
+            </a:r>
+            <a:r>
+              <a:rPr lang="vi-VN" sz="1400" dirty="0">
+                <a:latin typeface="Helvetica Neue"/>
+              </a:rPr>
+              <a:t>taxes_total: tổng của land và improvements.</a:t>
             </a:r>
           </a:p>
           <a:p>
             <a:pPr algn="just"/>
             <a:r>
-              <a:rPr lang="en-US" sz="1600" dirty="0">
-                <a:latin typeface="Helvetica Neue"/>
-              </a:rPr>
-              <a:t>13. owner: </a:t>
-            </a:r>
-            <a:r>
-              <a:rPr lang="en-US" sz="1600" dirty="0" err="1">
-                <a:latin typeface="Helvetica Neue"/>
-              </a:rPr>
-              <a:t>chính</a:t>
-            </a:r>
-            <a:r>
-              <a:rPr lang="en-US" sz="1600" dirty="0">
-                <a:latin typeface="Helvetica Neue"/>
-              </a:rPr>
-              <a:t> </a:t>
-            </a:r>
-            <a:r>
-              <a:rPr lang="en-US" sz="1600" dirty="0" err="1">
-                <a:latin typeface="Helvetica Neue"/>
-              </a:rPr>
-              <a:t>chủ</a:t>
-            </a:r>
-            <a:r>
-              <a:rPr lang="en-US" sz="1600" dirty="0">
-                <a:latin typeface="Helvetica Neue"/>
-              </a:rPr>
-              <a:t> (1/0).</a:t>
+              <a:rPr lang="en-US" sz="1400" dirty="0">
+                <a:latin typeface="Helvetica Neue"/>
+              </a:rPr>
+              <a:t>21. </a:t>
+            </a:r>
+            <a:r>
+              <a:rPr lang="vi-VN" sz="1400" dirty="0">
+                <a:latin typeface="Helvetica Neue"/>
+              </a:rPr>
+              <a:t>taxes_taxes: tiền thuế từ taxes_total.</a:t>
             </a:r>
           </a:p>
           <a:p>
             <a:pPr algn="just"/>
             <a:r>
-              <a:rPr lang="en-US" sz="1600" dirty="0">
-                <a:latin typeface="Helvetica Neue"/>
-              </a:rPr>
-              <a:t>14. alley: </a:t>
-            </a:r>
-            <a:r>
-              <a:rPr lang="en-US" sz="1600" dirty="0" err="1">
-                <a:latin typeface="Helvetica Neue"/>
-              </a:rPr>
-              <a:t>hẻm</a:t>
-            </a:r>
-            <a:r>
-              <a:rPr lang="en-US" sz="1600" dirty="0">
-                <a:latin typeface="Helvetica Neue"/>
-              </a:rPr>
-              <a:t> (1/0)</a:t>
+              <a:rPr lang="en-US" sz="1400" dirty="0">
+                <a:latin typeface="Helvetica Neue"/>
+              </a:rPr>
+              <a:t>22. </a:t>
+            </a:r>
+            <a:r>
+              <a:rPr lang="vi-VN" sz="1400" dirty="0">
+                <a:latin typeface="Helvetica Neue"/>
+              </a:rPr>
+              <a:t>school: số lượng trường học gần đó.</a:t>
             </a:r>
           </a:p>
           <a:p>
             <a:pPr algn="just"/>
             <a:r>
-              <a:rPr lang="en-US" sz="1600" dirty="0">
-                <a:latin typeface="Helvetica Neue"/>
-              </a:rPr>
-              <a:t>15. villa: </a:t>
-            </a:r>
-            <a:r>
-              <a:rPr lang="en-US" sz="1600" dirty="0" err="1">
-                <a:latin typeface="Helvetica Neue"/>
-              </a:rPr>
-              <a:t>biệt</a:t>
-            </a:r>
-            <a:r>
-              <a:rPr lang="en-US" sz="1600" dirty="0">
-                <a:latin typeface="Helvetica Neue"/>
-              </a:rPr>
-              <a:t> </a:t>
-            </a:r>
-            <a:r>
-              <a:rPr lang="en-US" sz="1600" dirty="0" err="1">
-                <a:latin typeface="Helvetica Neue"/>
-              </a:rPr>
-              <a:t>thự</a:t>
-            </a:r>
-            <a:r>
-              <a:rPr lang="en-US" sz="1600" dirty="0">
-                <a:latin typeface="Helvetica Neue"/>
-              </a:rPr>
-              <a:t> (1/0).</a:t>
+              <a:rPr lang="en-US" sz="1400" dirty="0">
+                <a:latin typeface="Helvetica Neue"/>
+              </a:rPr>
+              <a:t>23. </a:t>
+            </a:r>
+            <a:r>
+              <a:rPr lang="vi-VN" sz="1400" dirty="0">
+                <a:latin typeface="Helvetica Neue"/>
+              </a:rPr>
+              <a:t>total_crime: số lượng tội phạm.</a:t>
             </a:r>
           </a:p>
           <a:p>
             <a:pPr algn="just"/>
             <a:r>
-              <a:rPr lang="en-US" sz="1600" dirty="0">
-                <a:latin typeface="Helvetica Neue"/>
-              </a:rPr>
-              <a:t>16. new: </a:t>
-            </a:r>
-            <a:r>
-              <a:rPr lang="en-US" sz="1600" dirty="0" err="1">
-                <a:latin typeface="Helvetica Neue"/>
-              </a:rPr>
-              <a:t>nhà</a:t>
-            </a:r>
-            <a:r>
-              <a:rPr lang="en-US" sz="1600" dirty="0">
-                <a:latin typeface="Helvetica Neue"/>
-              </a:rPr>
-              <a:t> </a:t>
-            </a:r>
-            <a:r>
-              <a:rPr lang="en-US" sz="1600" dirty="0" err="1">
-                <a:latin typeface="Helvetica Neue"/>
-              </a:rPr>
-              <a:t>mới</a:t>
-            </a:r>
-            <a:r>
-              <a:rPr lang="en-US" sz="1600" dirty="0">
-                <a:latin typeface="Helvetica Neue"/>
-              </a:rPr>
-              <a:t> (1/0).</a:t>
+              <a:rPr lang="en-US" sz="1400" dirty="0">
+                <a:latin typeface="Helvetica Neue"/>
+              </a:rPr>
+              <a:t>24. </a:t>
+            </a:r>
+            <a:r>
+              <a:rPr lang="vi-VN" sz="1400" dirty="0">
+                <a:latin typeface="Helvetica Neue"/>
+              </a:rPr>
+              <a:t>violent_crime: số lượng tội phạm bạo lực.</a:t>
             </a:r>
           </a:p>
           <a:p>
             <a:pPr algn="just"/>
             <a:r>
-              <a:rPr lang="en-US" sz="1600" dirty="0">
-                <a:latin typeface="Helvetica Neue"/>
-              </a:rPr>
-              <a:t>17. price: </a:t>
-            </a:r>
-            <a:r>
-              <a:rPr lang="en-US" sz="1600" dirty="0" err="1">
-                <a:latin typeface="Helvetica Neue"/>
-              </a:rPr>
-              <a:t>giá</a:t>
-            </a:r>
-            <a:r>
-              <a:rPr lang="en-US" sz="1600" dirty="0">
-                <a:latin typeface="Helvetica Neue"/>
-              </a:rPr>
-              <a:t> </a:t>
-            </a:r>
-            <a:r>
-              <a:rPr lang="en-US" sz="1600" dirty="0" err="1">
-                <a:latin typeface="Helvetica Neue"/>
-              </a:rPr>
-              <a:t>nhà</a:t>
-            </a:r>
-            <a:r>
-              <a:rPr lang="en-US" sz="1600" dirty="0">
-                <a:latin typeface="Helvetica Neue"/>
-              </a:rPr>
-              <a:t> (</a:t>
-            </a:r>
-            <a:r>
-              <a:rPr lang="en-US" sz="1600" dirty="0" err="1">
-                <a:latin typeface="Helvetica Neue"/>
-              </a:rPr>
-              <a:t>triệu</a:t>
-            </a:r>
-            <a:r>
-              <a:rPr lang="en-US" sz="1600" dirty="0">
-                <a:latin typeface="Helvetica Neue"/>
-              </a:rPr>
-              <a:t> </a:t>
-            </a:r>
-            <a:r>
-              <a:rPr lang="en-US" sz="1600" dirty="0" err="1">
-                <a:latin typeface="Helvetica Neue"/>
-              </a:rPr>
-              <a:t>đồng</a:t>
-            </a:r>
-            <a:r>
-              <a:rPr lang="en-US" sz="1600" dirty="0">
-                <a:latin typeface="Helvetica Neue"/>
-              </a:rPr>
-              <a:t>).</a:t>
-            </a:r>
+              <a:rPr lang="en-US" sz="1400" dirty="0">
+                <a:latin typeface="Helvetica Neue"/>
+              </a:rPr>
+              <a:t>25. </a:t>
+            </a:r>
+            <a:r>
+              <a:rPr lang="vi-VN" sz="1400" dirty="0">
+                <a:latin typeface="Helvetica Neue"/>
+              </a:rPr>
+              <a:t>property_crime: số lượng tội phạm về tài sản.</a:t>
+            </a:r>
+          </a:p>
+          <a:p>
+            <a:pPr algn="just"/>
+            <a:r>
+              <a:rPr lang="en-US" sz="1400" dirty="0">
+                <a:latin typeface="Helvetica Neue"/>
+              </a:rPr>
+              <a:t>26. </a:t>
+            </a:r>
+            <a:r>
+              <a:rPr lang="vi-VN" sz="1400" dirty="0">
+                <a:latin typeface="Helvetica Neue"/>
+              </a:rPr>
+              <a:t>foreclosures: số lượng các căn nhà bị tịch thu gần đó.</a:t>
+            </a:r>
+            <a:endParaRPr lang="en-US" sz="1400" dirty="0">
+              <a:latin typeface="Helvetica Neue"/>
+            </a:endParaRPr>
           </a:p>
         </p:txBody>
       </p:sp>
@@ -7769,7 +6556,7 @@
         </p:nvSpPr>
         <p:spPr>
           <a:xfrm>
-            <a:off x="4320540" y="645574"/>
+            <a:off x="8315667" y="882111"/>
             <a:ext cx="3518912" cy="369332"/>
           </a:xfrm>
           <a:prstGeom prst="rect">
@@ -7831,7 +6618,7 @@
                 </a:solidFill>
                 <a:latin typeface="Helvetica Neue"/>
               </a:rPr>
-              <a:t>19443 </a:t>
+              <a:t>9593 </a:t>
             </a:r>
             <a:r>
               <a:rPr lang="en-US" dirty="0" err="1">
@@ -7870,7 +6657,7 @@
                 </a:solidFill>
                 <a:latin typeface="Helvetica Neue"/>
               </a:rPr>
-              <a:t>17 </a:t>
+              <a:t>26 </a:t>
             </a:r>
             <a:r>
               <a:rPr lang="en-US" dirty="0" err="1">
@@ -7890,12 +6677,42 @@
           </a:p>
         </p:txBody>
       </p:sp>
+      <p:sp>
+        <p:nvSpPr>
+          <p:cNvPr id="21" name="Slide Number Placeholder 20">
+            <a:extLst>
+              <a:ext uri="{FF2B5EF4-FFF2-40B4-BE49-F238E27FC236}">
+                <a16:creationId xmlns:a16="http://schemas.microsoft.com/office/drawing/2014/main" id="{DF816F17-F152-404C-9C97-EC96439EB3C4}"/>
+              </a:ext>
+            </a:extLst>
+          </p:cNvPr>
+          <p:cNvSpPr>
+            <a:spLocks noGrp="1"/>
+          </p:cNvSpPr>
+          <p:nvPr>
+            <p:ph type="sldNum" sz="quarter" idx="12"/>
+          </p:nvPr>
+        </p:nvSpPr>
+        <p:spPr/>
+        <p:txBody>
+          <a:bodyPr/>
+          <a:lstStyle/>
+          <a:p>
+            <a:fld id="{D57F1E4F-1CFF-5643-939E-217C01CDF565}" type="slidenum">
+              <a:rPr lang="en-US" smtClean="0"/>
+              <a:pPr/>
+              <a:t>10</a:t>
+            </a:fld>
+            <a:endParaRPr lang="en-US" dirty="0"/>
+          </a:p>
+        </p:txBody>
+      </p:sp>
       <p:pic>
         <p:nvPicPr>
-          <p:cNvPr id="6" name="Picture 5">
+          <p:cNvPr id="10" name="Picture 9">
             <a:extLst>
               <a:ext uri="{FF2B5EF4-FFF2-40B4-BE49-F238E27FC236}">
-                <a16:creationId xmlns:a16="http://schemas.microsoft.com/office/drawing/2014/main" id="{3C59A9CE-204C-45E4-A649-DD603C635771}"/>
+                <a16:creationId xmlns:a16="http://schemas.microsoft.com/office/drawing/2014/main" id="{C895B603-1C7E-4AF7-A8E5-69B46609D4A0}"/>
               </a:ext>
             </a:extLst>
           </p:cNvPr>
@@ -7905,15 +6722,15 @@
           <p:nvPr/>
         </p:nvPicPr>
         <p:blipFill>
-          <a:blip r:embed="rId3"/>
+          <a:blip r:embed="rId2"/>
           <a:stretch>
             <a:fillRect/>
           </a:stretch>
         </p:blipFill>
         <p:spPr>
           <a:xfrm>
-            <a:off x="4222064" y="1139482"/>
-            <a:ext cx="3755318" cy="3967089"/>
+            <a:off x="4342632" y="583612"/>
+            <a:ext cx="3609975" cy="4890719"/>
           </a:xfrm>
           <a:prstGeom prst="rect">
             <a:avLst/>
@@ -7922,22 +6739,22 @@
       </p:pic>
       <p:cxnSp>
         <p:nvCxnSpPr>
-          <p:cNvPr id="14" name="Straight Arrow Connector 13">
+          <p:cNvPr id="18" name="Straight Arrow Connector 17">
             <a:extLst>
               <a:ext uri="{FF2B5EF4-FFF2-40B4-BE49-F238E27FC236}">
-                <a16:creationId xmlns:a16="http://schemas.microsoft.com/office/drawing/2014/main" id="{8FB117F8-8C84-480D-BA88-D7861942285E}"/>
+                <a16:creationId xmlns:a16="http://schemas.microsoft.com/office/drawing/2014/main" id="{0756D0BE-E18A-4738-8D0D-65031FA553F7}"/>
               </a:ext>
             </a:extLst>
           </p:cNvPr>
           <p:cNvCxnSpPr>
-            <a:stCxn id="8" idx="3"/>
+            <a:cxnSpLocks/>
           </p:cNvCxnSpPr>
           <p:nvPr/>
         </p:nvCxnSpPr>
         <p:spPr>
-          <a:xfrm>
-            <a:off x="3727938" y="2078153"/>
-            <a:ext cx="592602" cy="454032"/>
+          <a:xfrm flipV="1">
+            <a:off x="4280601" y="2334886"/>
+            <a:ext cx="107563" cy="465866"/>
           </a:xfrm>
           <a:prstGeom prst="straightConnector1">
             <a:avLst/>
@@ -7966,22 +6783,23 @@
       </p:cxnSp>
       <p:cxnSp>
         <p:nvCxnSpPr>
-          <p:cNvPr id="16" name="Straight Arrow Connector 15">
+          <p:cNvPr id="20" name="Straight Arrow Connector 19">
             <a:extLst>
               <a:ext uri="{FF2B5EF4-FFF2-40B4-BE49-F238E27FC236}">
-                <a16:creationId xmlns:a16="http://schemas.microsoft.com/office/drawing/2014/main" id="{138546CF-BEC1-4293-996B-D61B3C0D1BA8}"/>
+                <a16:creationId xmlns:a16="http://schemas.microsoft.com/office/drawing/2014/main" id="{5778FB56-2A14-4BC1-8CAE-ABF1BB6A2D8B}"/>
               </a:ext>
             </a:extLst>
           </p:cNvPr>
           <p:cNvCxnSpPr>
             <a:cxnSpLocks/>
+            <a:stCxn id="9" idx="1"/>
           </p:cNvCxnSpPr>
           <p:nvPr/>
         </p:nvCxnSpPr>
         <p:spPr>
-          <a:xfrm flipH="1" flipV="1">
-            <a:off x="7880259" y="3922825"/>
-            <a:ext cx="254948" cy="136568"/>
+          <a:xfrm flipH="1">
+            <a:off x="7947858" y="3275767"/>
+            <a:ext cx="294912" cy="1043015"/>
           </a:xfrm>
           <a:prstGeom prst="straightConnector1">
             <a:avLst/>
@@ -8010,22 +6828,23 @@
       </p:cxnSp>
       <p:cxnSp>
         <p:nvCxnSpPr>
-          <p:cNvPr id="19" name="Straight Arrow Connector 18">
+          <p:cNvPr id="22" name="Straight Arrow Connector 21">
             <a:extLst>
               <a:ext uri="{FF2B5EF4-FFF2-40B4-BE49-F238E27FC236}">
-                <a16:creationId xmlns:a16="http://schemas.microsoft.com/office/drawing/2014/main" id="{969E9410-025F-418B-A677-DA954EDB25DA}"/>
+                <a16:creationId xmlns:a16="http://schemas.microsoft.com/office/drawing/2014/main" id="{A18D734C-5670-4233-8105-6C431B336215}"/>
               </a:ext>
             </a:extLst>
           </p:cNvPr>
           <p:cNvCxnSpPr>
-            <a:stCxn id="3" idx="2"/>
+            <a:cxnSpLocks/>
+            <a:stCxn id="3" idx="1"/>
           </p:cNvCxnSpPr>
           <p:nvPr/>
         </p:nvCxnSpPr>
         <p:spPr>
-          <a:xfrm>
-            <a:off x="6079996" y="1014906"/>
-            <a:ext cx="0" cy="293389"/>
+          <a:xfrm flipH="1" flipV="1">
+            <a:off x="7947856" y="882111"/>
+            <a:ext cx="367811" cy="184666"/>
           </a:xfrm>
           <a:prstGeom prst="straightConnector1">
             <a:avLst/>
@@ -8052,589 +6871,6 @@
           </a:fontRef>
         </p:style>
       </p:cxnSp>
-      <p:sp>
-        <p:nvSpPr>
-          <p:cNvPr id="21" name="Slide Number Placeholder 20">
-            <a:extLst>
-              <a:ext uri="{FF2B5EF4-FFF2-40B4-BE49-F238E27FC236}">
-                <a16:creationId xmlns:a16="http://schemas.microsoft.com/office/drawing/2014/main" id="{DF816F17-F152-404C-9C97-EC96439EB3C4}"/>
-              </a:ext>
-            </a:extLst>
-          </p:cNvPr>
-          <p:cNvSpPr>
-            <a:spLocks noGrp="1"/>
-          </p:cNvSpPr>
-          <p:nvPr>
-            <p:ph type="sldNum" sz="quarter" idx="12"/>
-          </p:nvPr>
-        </p:nvSpPr>
-        <p:spPr/>
-        <p:txBody>
-          <a:bodyPr/>
-          <a:lstStyle/>
-          <a:p>
-            <a:fld id="{D57F1E4F-1CFF-5643-939E-217C01CDF565}" type="slidenum">
-              <a:rPr lang="en-US" smtClean="0"/>
-              <a:pPr/>
-              <a:t>11</a:t>
-            </a:fld>
-            <a:endParaRPr lang="en-US" dirty="0"/>
-          </a:p>
-        </p:txBody>
-      </p:sp>
-      <p:sp>
-        <p:nvSpPr>
-          <p:cNvPr id="23" name="Rectangle 22">
-            <a:extLst>
-              <a:ext uri="{FF2B5EF4-FFF2-40B4-BE49-F238E27FC236}">
-                <a16:creationId xmlns:a16="http://schemas.microsoft.com/office/drawing/2014/main" id="{765611F9-ADDD-46E9-84B8-D91BA28C05EB}"/>
-              </a:ext>
-            </a:extLst>
-          </p:cNvPr>
-          <p:cNvSpPr/>
-          <p:nvPr/>
-        </p:nvSpPr>
-        <p:spPr>
-          <a:xfrm>
-            <a:off x="8539792" y="751397"/>
-            <a:ext cx="3325670" cy="1077218"/>
-          </a:xfrm>
-          <a:prstGeom prst="rect">
-            <a:avLst/>
-          </a:prstGeom>
-        </p:spPr>
-        <p:txBody>
-          <a:bodyPr wrap="square">
-            <a:spAutoFit/>
-          </a:bodyPr>
-          <a:lstStyle/>
-          <a:p>
-            <a:r>
-              <a:rPr lang="en-US" sz="1600" dirty="0" err="1">
-                <a:solidFill>
-                  <a:schemeClr val="tx2"/>
-                </a:solidFill>
-                <a:latin typeface="Helvetica Neue"/>
-              </a:rPr>
-              <a:t>Từ</a:t>
-            </a:r>
-            <a:r>
-              <a:rPr lang="en-US" sz="1600" dirty="0">
-                <a:solidFill>
-                  <a:schemeClr val="tx2"/>
-                </a:solidFill>
-                <a:latin typeface="Helvetica Neue"/>
-              </a:rPr>
-              <a:t> </a:t>
-            </a:r>
-            <a:r>
-              <a:rPr lang="en-US" sz="1600" dirty="0">
-                <a:solidFill>
-                  <a:srgbClr val="00B050"/>
-                </a:solidFill>
-                <a:latin typeface="Helvetica Neue"/>
-              </a:rPr>
-              <a:t>19957 </a:t>
-            </a:r>
-            <a:r>
-              <a:rPr lang="en-US" sz="1600" dirty="0" err="1">
-                <a:solidFill>
-                  <a:srgbClr val="00B050"/>
-                </a:solidFill>
-                <a:latin typeface="Helvetica Neue"/>
-              </a:rPr>
-              <a:t>bản</a:t>
-            </a:r>
-            <a:r>
-              <a:rPr lang="en-US" sz="1600" dirty="0">
-                <a:solidFill>
-                  <a:srgbClr val="00B050"/>
-                </a:solidFill>
-                <a:latin typeface="Helvetica Neue"/>
-              </a:rPr>
-              <a:t> tin</a:t>
-            </a:r>
-            <a:r>
-              <a:rPr lang="en-US" sz="1600" dirty="0">
-                <a:solidFill>
-                  <a:schemeClr val="tx2"/>
-                </a:solidFill>
-                <a:latin typeface="Helvetica Neue"/>
-              </a:rPr>
-              <a:t>, </a:t>
-            </a:r>
-            <a:r>
-              <a:rPr lang="en-US" sz="1600" dirty="0" err="1">
-                <a:solidFill>
-                  <a:schemeClr val="tx2"/>
-                </a:solidFill>
-                <a:latin typeface="Helvetica Neue"/>
-              </a:rPr>
-              <a:t>trong</a:t>
-            </a:r>
-            <a:r>
-              <a:rPr lang="en-US" sz="1600" dirty="0">
-                <a:solidFill>
-                  <a:schemeClr val="tx2"/>
-                </a:solidFill>
-                <a:latin typeface="Helvetica Neue"/>
-              </a:rPr>
-              <a:t> </a:t>
-            </a:r>
-            <a:r>
-              <a:rPr lang="en-US" sz="1600" dirty="0" err="1">
-                <a:solidFill>
-                  <a:schemeClr val="tx2"/>
-                </a:solidFill>
-                <a:latin typeface="Helvetica Neue"/>
-              </a:rPr>
-              <a:t>quá</a:t>
-            </a:r>
-            <a:r>
-              <a:rPr lang="en-US" sz="1600" dirty="0">
-                <a:solidFill>
-                  <a:schemeClr val="tx2"/>
-                </a:solidFill>
-                <a:latin typeface="Helvetica Neue"/>
-              </a:rPr>
-              <a:t> </a:t>
-            </a:r>
-            <a:r>
-              <a:rPr lang="en-US" sz="1600" dirty="0" err="1">
-                <a:solidFill>
-                  <a:schemeClr val="tx2"/>
-                </a:solidFill>
-                <a:latin typeface="Helvetica Neue"/>
-              </a:rPr>
-              <a:t>lấy</a:t>
-            </a:r>
-            <a:r>
-              <a:rPr lang="en-US" sz="1600" dirty="0">
-                <a:solidFill>
-                  <a:schemeClr val="tx2"/>
-                </a:solidFill>
-                <a:latin typeface="Helvetica Neue"/>
-              </a:rPr>
-              <a:t> </a:t>
-            </a:r>
-            <a:r>
-              <a:rPr lang="en-US" sz="1600" dirty="0" err="1">
-                <a:solidFill>
-                  <a:schemeClr val="tx2"/>
-                </a:solidFill>
-                <a:latin typeface="Helvetica Neue"/>
-              </a:rPr>
-              <a:t>thông</a:t>
-            </a:r>
-            <a:r>
-              <a:rPr lang="en-US" sz="1600" dirty="0">
-                <a:solidFill>
-                  <a:schemeClr val="tx2"/>
-                </a:solidFill>
-                <a:latin typeface="Helvetica Neue"/>
-              </a:rPr>
-              <a:t> tin </a:t>
-            </a:r>
-            <a:r>
-              <a:rPr lang="en-US" sz="1600" dirty="0" err="1">
-                <a:solidFill>
-                  <a:schemeClr val="tx2"/>
-                </a:solidFill>
-                <a:latin typeface="Helvetica Neue"/>
-              </a:rPr>
-              <a:t>thì</a:t>
-            </a:r>
-            <a:r>
-              <a:rPr lang="en-US" sz="1600" dirty="0">
-                <a:solidFill>
-                  <a:schemeClr val="tx2"/>
-                </a:solidFill>
-                <a:latin typeface="Helvetica Neue"/>
-              </a:rPr>
-              <a:t> </a:t>
-            </a:r>
-            <a:r>
-              <a:rPr lang="en-US" sz="1600" dirty="0" err="1">
-                <a:solidFill>
-                  <a:schemeClr val="tx2"/>
-                </a:solidFill>
-                <a:latin typeface="Helvetica Neue"/>
-              </a:rPr>
-              <a:t>những</a:t>
-            </a:r>
-            <a:r>
-              <a:rPr lang="en-US" sz="1600" dirty="0">
-                <a:solidFill>
-                  <a:schemeClr val="tx2"/>
-                </a:solidFill>
-                <a:latin typeface="Helvetica Neue"/>
-              </a:rPr>
-              <a:t> </a:t>
-            </a:r>
-            <a:r>
-              <a:rPr lang="en-US" sz="1600" dirty="0" err="1">
-                <a:solidFill>
-                  <a:schemeClr val="tx2"/>
-                </a:solidFill>
-                <a:latin typeface="Helvetica Neue"/>
-              </a:rPr>
-              <a:t>bản</a:t>
-            </a:r>
-            <a:r>
-              <a:rPr lang="en-US" sz="1600" dirty="0">
-                <a:solidFill>
-                  <a:schemeClr val="tx2"/>
-                </a:solidFill>
-                <a:latin typeface="Helvetica Neue"/>
-              </a:rPr>
-              <a:t> tin </a:t>
-            </a:r>
-            <a:r>
-              <a:rPr lang="en-US" sz="1600" dirty="0" err="1">
-                <a:solidFill>
-                  <a:srgbClr val="0070C0"/>
-                </a:solidFill>
-                <a:latin typeface="Helvetica Neue"/>
-              </a:rPr>
-              <a:t>không</a:t>
-            </a:r>
-            <a:r>
-              <a:rPr lang="en-US" sz="1600" dirty="0">
-                <a:solidFill>
-                  <a:srgbClr val="0070C0"/>
-                </a:solidFill>
-                <a:latin typeface="Helvetica Neue"/>
-              </a:rPr>
-              <a:t> </a:t>
-            </a:r>
-            <a:r>
-              <a:rPr lang="en-US" sz="1600" dirty="0" err="1">
-                <a:solidFill>
-                  <a:srgbClr val="0070C0"/>
-                </a:solidFill>
-                <a:latin typeface="Helvetica Neue"/>
-              </a:rPr>
-              <a:t>có</a:t>
-            </a:r>
-            <a:r>
-              <a:rPr lang="en-US" sz="1600" dirty="0">
-                <a:solidFill>
-                  <a:srgbClr val="0070C0"/>
-                </a:solidFill>
-                <a:latin typeface="Helvetica Neue"/>
-              </a:rPr>
-              <a:t> “</a:t>
-            </a:r>
-            <a:r>
-              <a:rPr lang="en-US" sz="1600" dirty="0" err="1">
-                <a:solidFill>
-                  <a:srgbClr val="0070C0"/>
-                </a:solidFill>
-                <a:latin typeface="Helvetica Neue"/>
-              </a:rPr>
-              <a:t>giá</a:t>
-            </a:r>
-            <a:r>
-              <a:rPr lang="en-US" sz="1600" dirty="0">
-                <a:solidFill>
-                  <a:srgbClr val="0070C0"/>
-                </a:solidFill>
-                <a:latin typeface="Helvetica Neue"/>
-              </a:rPr>
-              <a:t> </a:t>
-            </a:r>
-            <a:r>
-              <a:rPr lang="en-US" sz="1600" dirty="0" err="1">
-                <a:solidFill>
-                  <a:srgbClr val="0070C0"/>
-                </a:solidFill>
-                <a:latin typeface="Helvetica Neue"/>
-              </a:rPr>
-              <a:t>nhà</a:t>
-            </a:r>
-            <a:r>
-              <a:rPr lang="en-US" sz="1600" dirty="0">
-                <a:solidFill>
-                  <a:srgbClr val="0070C0"/>
-                </a:solidFill>
-                <a:latin typeface="Helvetica Neue"/>
-              </a:rPr>
-              <a:t>” </a:t>
-            </a:r>
-            <a:r>
-              <a:rPr lang="en-US" sz="1600" dirty="0" err="1">
-                <a:solidFill>
-                  <a:srgbClr val="0070C0"/>
-                </a:solidFill>
-                <a:latin typeface="Helvetica Neue"/>
-              </a:rPr>
-              <a:t>nhóm</a:t>
-            </a:r>
-            <a:r>
-              <a:rPr lang="en-US" sz="1600" dirty="0">
-                <a:solidFill>
-                  <a:srgbClr val="0070C0"/>
-                </a:solidFill>
-                <a:latin typeface="Helvetica Neue"/>
-              </a:rPr>
-              <a:t> </a:t>
-            </a:r>
-            <a:r>
-              <a:rPr lang="en-US" sz="1600" dirty="0" err="1">
-                <a:solidFill>
-                  <a:srgbClr val="0070C0"/>
-                </a:solidFill>
-                <a:latin typeface="Helvetica Neue"/>
-              </a:rPr>
-              <a:t>sẽ</a:t>
-            </a:r>
-            <a:r>
-              <a:rPr lang="en-US" sz="1600" dirty="0">
-                <a:solidFill>
-                  <a:srgbClr val="0070C0"/>
-                </a:solidFill>
-                <a:latin typeface="Helvetica Neue"/>
-              </a:rPr>
-              <a:t> </a:t>
-            </a:r>
-            <a:r>
-              <a:rPr lang="en-US" sz="1600" dirty="0" err="1">
-                <a:solidFill>
-                  <a:srgbClr val="0070C0"/>
-                </a:solidFill>
-                <a:latin typeface="Helvetica Neue"/>
-              </a:rPr>
-              <a:t>bỏ</a:t>
-            </a:r>
-            <a:r>
-              <a:rPr lang="en-US" sz="1600" dirty="0">
-                <a:solidFill>
-                  <a:schemeClr val="tx2"/>
-                </a:solidFill>
-                <a:latin typeface="Helvetica Neue"/>
-              </a:rPr>
-              <a:t> </a:t>
-            </a:r>
-            <a:r>
-              <a:rPr lang="en-US" sz="1600" dirty="0" err="1">
-                <a:solidFill>
-                  <a:srgbClr val="0070C0"/>
-                </a:solidFill>
-                <a:latin typeface="Helvetica Neue"/>
-              </a:rPr>
-              <a:t>đi</a:t>
-            </a:r>
-            <a:r>
-              <a:rPr lang="en-US" sz="1600" dirty="0">
-                <a:solidFill>
-                  <a:srgbClr val="0070C0"/>
-                </a:solidFill>
-                <a:latin typeface="Helvetica Neue"/>
-              </a:rPr>
-              <a:t> </a:t>
-            </a:r>
-            <a:r>
-              <a:rPr lang="en-US" sz="1600" dirty="0" err="1">
-                <a:solidFill>
-                  <a:schemeClr val="tx2"/>
-                </a:solidFill>
-                <a:latin typeface="Helvetica Neue"/>
-              </a:rPr>
-              <a:t>không</a:t>
-            </a:r>
-            <a:r>
-              <a:rPr lang="en-US" sz="1600" dirty="0">
-                <a:solidFill>
-                  <a:schemeClr val="tx2"/>
-                </a:solidFill>
-                <a:latin typeface="Helvetica Neue"/>
-              </a:rPr>
-              <a:t> </a:t>
-            </a:r>
-            <a:r>
-              <a:rPr lang="en-US" sz="1600" dirty="0" err="1">
-                <a:solidFill>
-                  <a:schemeClr val="tx2"/>
-                </a:solidFill>
-                <a:latin typeface="Helvetica Neue"/>
-              </a:rPr>
-              <a:t>lấy</a:t>
-            </a:r>
-            <a:r>
-              <a:rPr lang="en-US" sz="1600" dirty="0">
-                <a:solidFill>
-                  <a:schemeClr val="tx2"/>
-                </a:solidFill>
-                <a:latin typeface="Helvetica Neue"/>
-              </a:rPr>
-              <a:t> </a:t>
-            </a:r>
-            <a:r>
-              <a:rPr lang="en-US" sz="1600" dirty="0" err="1">
-                <a:solidFill>
-                  <a:schemeClr val="tx2"/>
-                </a:solidFill>
-                <a:latin typeface="Helvetica Neue"/>
-              </a:rPr>
-              <a:t>nên</a:t>
-            </a:r>
-            <a:r>
-              <a:rPr lang="en-US" sz="1600" dirty="0">
-                <a:solidFill>
-                  <a:schemeClr val="tx2"/>
-                </a:solidFill>
-                <a:latin typeface="Helvetica Neue"/>
-              </a:rPr>
-              <a:t> </a:t>
-            </a:r>
-            <a:r>
-              <a:rPr lang="en-US" sz="1600" dirty="0" err="1">
-                <a:solidFill>
-                  <a:schemeClr val="tx2"/>
-                </a:solidFill>
-                <a:latin typeface="Helvetica Neue"/>
-              </a:rPr>
-              <a:t>chỉ</a:t>
-            </a:r>
-            <a:r>
-              <a:rPr lang="en-US" sz="1600" dirty="0">
-                <a:solidFill>
-                  <a:schemeClr val="tx2"/>
-                </a:solidFill>
-                <a:latin typeface="Helvetica Neue"/>
-              </a:rPr>
-              <a:t> </a:t>
-            </a:r>
-            <a:r>
-              <a:rPr lang="en-US" sz="1600" dirty="0" err="1">
-                <a:solidFill>
-                  <a:schemeClr val="tx2"/>
-                </a:solidFill>
-                <a:latin typeface="Helvetica Neue"/>
-              </a:rPr>
-              <a:t>còn</a:t>
-            </a:r>
-            <a:r>
-              <a:rPr lang="en-US" sz="1600" dirty="0">
-                <a:solidFill>
-                  <a:schemeClr val="tx2"/>
-                </a:solidFill>
-                <a:latin typeface="Helvetica Neue"/>
-              </a:rPr>
-              <a:t> </a:t>
-            </a:r>
-            <a:r>
-              <a:rPr lang="en-US" sz="1600" dirty="0">
-                <a:solidFill>
-                  <a:srgbClr val="FF0000"/>
-                </a:solidFill>
-                <a:latin typeface="Helvetica Neue"/>
-              </a:rPr>
-              <a:t>19443 </a:t>
-            </a:r>
-            <a:r>
-              <a:rPr lang="en-US" sz="1600" dirty="0" err="1">
-                <a:solidFill>
-                  <a:srgbClr val="FF0000"/>
-                </a:solidFill>
-                <a:latin typeface="Helvetica Neue"/>
-              </a:rPr>
-              <a:t>dòng</a:t>
-            </a:r>
-            <a:r>
-              <a:rPr lang="en-US" sz="1600" dirty="0">
-                <a:solidFill>
-                  <a:schemeClr val="tx2"/>
-                </a:solidFill>
-                <a:latin typeface="Helvetica Neue"/>
-              </a:rPr>
-              <a:t>.</a:t>
-            </a:r>
-            <a:endParaRPr lang="en-US" sz="1600" dirty="0">
-              <a:solidFill>
-                <a:schemeClr val="tx2"/>
-              </a:solidFill>
-            </a:endParaRPr>
-          </a:p>
-        </p:txBody>
-      </p:sp>
-      <p:sp>
-        <p:nvSpPr>
-          <p:cNvPr id="25" name="Rectangle: Rounded Corners 24">
-            <a:extLst>
-              <a:ext uri="{FF2B5EF4-FFF2-40B4-BE49-F238E27FC236}">
-                <a16:creationId xmlns:a16="http://schemas.microsoft.com/office/drawing/2014/main" id="{7D19751F-1F15-463B-BDEB-B56B413AE888}"/>
-              </a:ext>
-            </a:extLst>
-          </p:cNvPr>
-          <p:cNvSpPr/>
-          <p:nvPr/>
-        </p:nvSpPr>
-        <p:spPr>
-          <a:xfrm>
-            <a:off x="8432054" y="694155"/>
-            <a:ext cx="3433408" cy="1318251"/>
-          </a:xfrm>
-          <a:prstGeom prst="roundRect">
-            <a:avLst/>
-          </a:prstGeom>
-          <a:noFill/>
-        </p:spPr>
-        <p:style>
-          <a:lnRef idx="2">
-            <a:schemeClr val="accent1">
-              <a:shade val="50000"/>
-            </a:schemeClr>
-          </a:lnRef>
-          <a:fillRef idx="1">
-            <a:schemeClr val="accent1"/>
-          </a:fillRef>
-          <a:effectRef idx="0">
-            <a:schemeClr val="accent1"/>
-          </a:effectRef>
-          <a:fontRef idx="minor">
-            <a:schemeClr val="lt1"/>
-          </a:fontRef>
-        </p:style>
-        <p:txBody>
-          <a:bodyPr rtlCol="0" anchor="ctr"/>
-          <a:lstStyle/>
-          <a:p>
-            <a:pPr algn="ctr"/>
-            <a:endParaRPr lang="en-US"/>
-          </a:p>
-        </p:txBody>
-      </p:sp>
-      <p:pic>
-        <p:nvPicPr>
-          <p:cNvPr id="28" name="Picture 27" descr="A picture containing drawing&#10;&#10;Description automatically generated">
-            <a:extLst>
-              <a:ext uri="{FF2B5EF4-FFF2-40B4-BE49-F238E27FC236}">
-                <a16:creationId xmlns:a16="http://schemas.microsoft.com/office/drawing/2014/main" id="{80C0D89D-2F13-4D5A-8159-C9A1E6F1A239}"/>
-              </a:ext>
-            </a:extLst>
-          </p:cNvPr>
-          <p:cNvPicPr>
-            <a:picLocks noChangeAspect="1"/>
-          </p:cNvPicPr>
-          <p:nvPr/>
-        </p:nvPicPr>
-        <p:blipFill>
-          <a:blip r:embed="rId4"/>
-          <a:stretch>
-            <a:fillRect/>
-          </a:stretch>
-        </p:blipFill>
-        <p:spPr>
-          <a:xfrm>
-            <a:off x="11100387" y="1561317"/>
-            <a:ext cx="691734" cy="599695"/>
-          </a:xfrm>
-          <a:prstGeom prst="rect">
-            <a:avLst/>
-          </a:prstGeom>
-        </p:spPr>
-      </p:pic>
     </p:spTree>
     <p:extLst>
       <p:ext uri="{BB962C8B-B14F-4D97-AF65-F5344CB8AC3E}">
@@ -8648,8 +6884,8 @@
 </p:sld>
 </file>
 
-<file path=ppt/slides/slide12.xml><?xml version="1.0" encoding="utf-8"?>
-<p:sld xmlns:a="http://schemas.openxmlformats.org/drawingml/2006/main" xmlns:r="http://schemas.openxmlformats.org/officeDocument/2006/relationships" xmlns:p="http://schemas.openxmlformats.org/presentationml/2006/main" show="0">
+<file path=ppt/slides/slide11.xml><?xml version="1.0" encoding="utf-8"?>
+<p:sld xmlns:a="http://schemas.openxmlformats.org/drawingml/2006/main" xmlns:r="http://schemas.openxmlformats.org/officeDocument/2006/relationships" xmlns:p="http://schemas.openxmlformats.org/presentationml/2006/main">
   <p:cSld>
     <p:spTree>
       <p:nvGrpSpPr>
@@ -8730,7 +6966,7 @@
             <a:fld id="{D57F1E4F-1CFF-5643-939E-217C01CDF565}" type="slidenum">
               <a:rPr lang="en-US" smtClean="0"/>
               <a:pPr/>
-              <a:t>12</a:t>
+              <a:t>11</a:t>
             </a:fld>
             <a:endParaRPr lang="en-US" dirty="0"/>
           </a:p>
@@ -8751,7 +6987,7 @@
         <p:spPr>
           <a:xfrm>
             <a:off x="487388" y="694155"/>
-            <a:ext cx="3634446" cy="2554545"/>
+            <a:ext cx="3817326" cy="3785652"/>
           </a:xfrm>
           <a:prstGeom prst="rect">
             <a:avLst/>
@@ -8776,7 +7012,7 @@
                 </a:solidFill>
                 <a:latin typeface="Helvetica Neue"/>
               </a:rPr>
-              <a:t>Các</a:t>
+              <a:t>Có</a:t>
             </a:r>
             <a:r>
               <a:rPr lang="en-US" sz="1600" b="1" dirty="0">
@@ -8785,7 +7021,7 @@
                 </a:solidFill>
                 <a:latin typeface="Helvetica Neue"/>
               </a:rPr>
-              <a:t> </a:t>
+              <a:t> 14 </a:t>
             </a:r>
             <a:r>
               <a:rPr lang="en-US" sz="1600" b="1" dirty="0" err="1">
@@ -8902,25 +7138,37 @@
               <a:rPr lang="en-US" sz="1600" dirty="0">
                 <a:latin typeface="Helvetica Neue"/>
               </a:rPr>
-              <a:t>- are </a:t>
+              <a:t>- </a:t>
             </a:r>
             <a:r>
               <a:rPr lang="en-US" sz="1600" dirty="0" err="1">
                 <a:latin typeface="Helvetica Neue"/>
               </a:rPr>
+              <a:t>date_sold</a:t>
+            </a:r>
+            <a:r>
+              <a:rPr lang="en-US" sz="1600" dirty="0">
+                <a:latin typeface="Helvetica Neue"/>
+              </a:rPr>
+              <a:t> </a:t>
+            </a:r>
+            <a:r>
+              <a:rPr lang="en-US" sz="1600" dirty="0" err="1">
+                <a:latin typeface="Helvetica Neue"/>
+              </a:rPr>
               <a:t>thiếu</a:t>
             </a:r>
             <a:r>
               <a:rPr lang="en-US" sz="1600" dirty="0">
                 <a:latin typeface="Helvetica Neue"/>
               </a:rPr>
-              <a:t> </a:t>
-            </a:r>
-            <a:r>
-              <a:rPr lang="en-US" sz="1600" b="1" dirty="0">
-                <a:latin typeface="Helvetica Neue"/>
-              </a:rPr>
-              <a:t>1182</a:t>
+              <a:t> 151 </a:t>
+            </a:r>
+            <a:r>
+              <a:rPr lang="en-US" sz="1600" dirty="0" err="1">
+                <a:latin typeface="Helvetica Neue"/>
+              </a:rPr>
+              <a:t>giá</a:t>
             </a:r>
             <a:r>
               <a:rPr lang="en-US" sz="1600" dirty="0">
@@ -8932,6 +7180,39 @@
               <a:rPr lang="en-US" sz="1600" dirty="0" err="1">
                 <a:latin typeface="Helvetica Neue"/>
               </a:rPr>
+              <a:t>trị</a:t>
+            </a:r>
+            <a:r>
+              <a:rPr lang="en-US" sz="1600" dirty="0">
+                <a:latin typeface="Helvetica Neue"/>
+              </a:rPr>
+              <a:t>.</a:t>
+            </a:r>
+          </a:p>
+          <a:p>
+            <a:pPr algn="just"/>
+            <a:r>
+              <a:rPr lang="en-US" sz="1600" dirty="0">
+                <a:latin typeface="Helvetica Neue"/>
+              </a:rPr>
+              <a:t>- mortgage </a:t>
+            </a:r>
+            <a:r>
+              <a:rPr lang="en-US" sz="1600" dirty="0" err="1">
+                <a:latin typeface="Helvetica Neue"/>
+              </a:rPr>
+              <a:t>thiếu</a:t>
+            </a:r>
+            <a:r>
+              <a:rPr lang="en-US" sz="1600" dirty="0">
+                <a:latin typeface="Helvetica Neue"/>
+              </a:rPr>
+              <a:t> 112 </a:t>
+            </a:r>
+            <a:r>
+              <a:rPr lang="en-US" sz="1600" dirty="0" err="1">
+                <a:latin typeface="Helvetica Neue"/>
+              </a:rPr>
               <a:t>giá</a:t>
             </a:r>
             <a:r>
@@ -8959,25 +7240,37 @@
               <a:rPr lang="en-US" sz="1600" dirty="0">
                 <a:latin typeface="Helvetica Neue"/>
               </a:rPr>
-              <a:t>- address </a:t>
+              <a:t>- </a:t>
             </a:r>
             <a:r>
               <a:rPr lang="en-US" sz="1600" dirty="0" err="1">
                 <a:latin typeface="Helvetica Neue"/>
               </a:rPr>
+              <a:t>info_bedrooms</a:t>
+            </a:r>
+            <a:r>
+              <a:rPr lang="en-US" sz="1600" dirty="0">
+                <a:latin typeface="Helvetica Neue"/>
+              </a:rPr>
+              <a:t> </a:t>
+            </a:r>
+            <a:r>
+              <a:rPr lang="en-US" sz="1600" dirty="0" err="1">
+                <a:latin typeface="Helvetica Neue"/>
+              </a:rPr>
               <a:t>thiếu</a:t>
             </a:r>
             <a:r>
               <a:rPr lang="en-US" sz="1600" dirty="0">
                 <a:latin typeface="Helvetica Neue"/>
               </a:rPr>
-              <a:t> </a:t>
-            </a:r>
-            <a:r>
-              <a:rPr lang="en-US" sz="1600" b="1" dirty="0">
-                <a:latin typeface="Helvetica Neue"/>
-              </a:rPr>
-              <a:t>470</a:t>
+              <a:t> 1634 </a:t>
+            </a:r>
+            <a:r>
+              <a:rPr lang="en-US" sz="1600" dirty="0" err="1">
+                <a:latin typeface="Helvetica Neue"/>
+              </a:rPr>
+              <a:t>giá</a:t>
             </a:r>
             <a:r>
               <a:rPr lang="en-US" sz="1600" dirty="0">
@@ -8989,6 +7282,51 @@
               <a:rPr lang="en-US" sz="1600" dirty="0" err="1">
                 <a:latin typeface="Helvetica Neue"/>
               </a:rPr>
+              <a:t>trị</a:t>
+            </a:r>
+            <a:r>
+              <a:rPr lang="en-US" sz="1600" dirty="0">
+                <a:latin typeface="Helvetica Neue"/>
+              </a:rPr>
+              <a:t>.</a:t>
+            </a:r>
+          </a:p>
+          <a:p>
+            <a:pPr algn="just"/>
+            <a:r>
+              <a:rPr lang="en-US" sz="1600" dirty="0">
+                <a:latin typeface="Helvetica Neue"/>
+              </a:rPr>
+              <a:t>- </a:t>
+            </a:r>
+            <a:r>
+              <a:rPr lang="en-US" sz="1600" dirty="0" err="1">
+                <a:latin typeface="Helvetica Neue"/>
+              </a:rPr>
+              <a:t>info_bathrooms</a:t>
+            </a:r>
+            <a:r>
+              <a:rPr lang="en-US" sz="1600" dirty="0">
+                <a:latin typeface="Helvetica Neue"/>
+              </a:rPr>
+              <a:t> </a:t>
+            </a:r>
+            <a:r>
+              <a:rPr lang="en-US" sz="1600" dirty="0" err="1">
+                <a:latin typeface="Helvetica Neue"/>
+              </a:rPr>
+              <a:t>thiếu</a:t>
+            </a:r>
+            <a:r>
+              <a:rPr lang="en-US" sz="1600" dirty="0">
+                <a:latin typeface="Helvetica Neue"/>
+              </a:rPr>
+              <a:t> 1481 </a:t>
+            </a:r>
+            <a:r>
+              <a:rPr lang="en-US" sz="1600" dirty="0" err="1">
+                <a:latin typeface="Helvetica Neue"/>
+              </a:rPr>
               <a:t>giá</a:t>
             </a:r>
             <a:r>
@@ -9003,9 +7341,12 @@
               </a:rPr>
               <a:t>trị</a:t>
             </a:r>
-            <a:endParaRPr lang="en-US" sz="1600" dirty="0">
-              <a:latin typeface="Helvetica Neue"/>
-            </a:endParaRPr>
+            <a:r>
+              <a:rPr lang="en-US" sz="1600" dirty="0">
+                <a:latin typeface="Helvetica Neue"/>
+              </a:rPr>
+              <a:t>.</a:t>
+            </a:r>
           </a:p>
           <a:p>
             <a:pPr algn="just"/>
@@ -9013,25 +7354,37 @@
               <a:rPr lang="en-US" sz="1600" dirty="0">
                 <a:latin typeface="Helvetica Neue"/>
               </a:rPr>
-              <a:t>- floors </a:t>
+              <a:t>- </a:t>
             </a:r>
             <a:r>
               <a:rPr lang="en-US" sz="1600" dirty="0" err="1">
                 <a:latin typeface="Helvetica Neue"/>
               </a:rPr>
+              <a:t>info_size</a:t>
+            </a:r>
+            <a:r>
+              <a:rPr lang="en-US" sz="1600" dirty="0">
+                <a:latin typeface="Helvetica Neue"/>
+              </a:rPr>
+              <a:t> </a:t>
+            </a:r>
+            <a:r>
+              <a:rPr lang="en-US" sz="1600" dirty="0" err="1">
+                <a:latin typeface="Helvetica Neue"/>
+              </a:rPr>
               <a:t>thiếu</a:t>
             </a:r>
             <a:r>
               <a:rPr lang="en-US" sz="1600" dirty="0">
                 <a:latin typeface="Helvetica Neue"/>
               </a:rPr>
-              <a:t> </a:t>
-            </a:r>
-            <a:r>
-              <a:rPr lang="en-US" sz="1600" b="1" dirty="0">
-                <a:latin typeface="Helvetica Neue"/>
-              </a:rPr>
-              <a:t>7166</a:t>
+              <a:t> 1090 </a:t>
+            </a:r>
+            <a:r>
+              <a:rPr lang="en-US" sz="1600" dirty="0" err="1">
+                <a:latin typeface="Helvetica Neue"/>
+              </a:rPr>
+              <a:t>giá</a:t>
             </a:r>
             <a:r>
               <a:rPr lang="en-US" sz="1600" dirty="0">
@@ -9043,6 +7396,51 @@
               <a:rPr lang="en-US" sz="1600" dirty="0" err="1">
                 <a:latin typeface="Helvetica Neue"/>
               </a:rPr>
+              <a:t>trị</a:t>
+            </a:r>
+            <a:r>
+              <a:rPr lang="en-US" sz="1600" dirty="0">
+                <a:latin typeface="Helvetica Neue"/>
+              </a:rPr>
+              <a:t>.</a:t>
+            </a:r>
+          </a:p>
+          <a:p>
+            <a:pPr algn="just"/>
+            <a:r>
+              <a:rPr lang="en-US" sz="1600" dirty="0">
+                <a:latin typeface="Helvetica Neue"/>
+              </a:rPr>
+              <a:t>- </a:t>
+            </a:r>
+            <a:r>
+              <a:rPr lang="en-US" sz="1600" dirty="0" err="1">
+                <a:latin typeface="Helvetica Neue"/>
+              </a:rPr>
+              <a:t>info_lot_size</a:t>
+            </a:r>
+            <a:r>
+              <a:rPr lang="en-US" sz="1600" dirty="0">
+                <a:latin typeface="Helvetica Neue"/>
+              </a:rPr>
+              <a:t> </a:t>
+            </a:r>
+            <a:r>
+              <a:rPr lang="en-US" sz="1600" dirty="0" err="1">
+                <a:latin typeface="Helvetica Neue"/>
+              </a:rPr>
+              <a:t>thiếu</a:t>
+            </a:r>
+            <a:r>
+              <a:rPr lang="en-US" sz="1600" dirty="0">
+                <a:latin typeface="Helvetica Neue"/>
+              </a:rPr>
+              <a:t> 1334 </a:t>
+            </a:r>
+            <a:r>
+              <a:rPr lang="en-US" sz="1600" dirty="0" err="1">
+                <a:latin typeface="Helvetica Neue"/>
+              </a:rPr>
               <a:t>giá</a:t>
             </a:r>
             <a:r>
@@ -9057,9 +7455,12 @@
               </a:rPr>
               <a:t>trị</a:t>
             </a:r>
-            <a:endParaRPr lang="en-US" sz="1600" dirty="0">
-              <a:latin typeface="Helvetica Neue"/>
-            </a:endParaRPr>
+            <a:r>
+              <a:rPr lang="en-US" sz="1600" dirty="0">
+                <a:latin typeface="Helvetica Neue"/>
+              </a:rPr>
+              <a:t>.</a:t>
+            </a:r>
           </a:p>
           <a:p>
             <a:pPr algn="just"/>
@@ -9067,25 +7468,37 @@
               <a:rPr lang="en-US" sz="1600" dirty="0">
                 <a:latin typeface="Helvetica Neue"/>
               </a:rPr>
-              <a:t>- bedrooms </a:t>
+              <a:t>- </a:t>
             </a:r>
             <a:r>
               <a:rPr lang="en-US" sz="1600" dirty="0" err="1">
                 <a:latin typeface="Helvetica Neue"/>
               </a:rPr>
+              <a:t>info_year_built</a:t>
+            </a:r>
+            <a:r>
+              <a:rPr lang="en-US" sz="1600" dirty="0">
+                <a:latin typeface="Helvetica Neue"/>
+              </a:rPr>
+              <a:t> </a:t>
+            </a:r>
+            <a:r>
+              <a:rPr lang="en-US" sz="1600" dirty="0" err="1">
+                <a:latin typeface="Helvetica Neue"/>
+              </a:rPr>
               <a:t>thiếu</a:t>
             </a:r>
             <a:r>
               <a:rPr lang="en-US" sz="1600" dirty="0">
                 <a:latin typeface="Helvetica Neue"/>
               </a:rPr>
-              <a:t> </a:t>
-            </a:r>
-            <a:r>
-              <a:rPr lang="en-US" sz="1600" b="1" dirty="0">
-                <a:latin typeface="Helvetica Neue"/>
-              </a:rPr>
-              <a:t>10615</a:t>
+              <a:t>  1121 </a:t>
+            </a:r>
+            <a:r>
+              <a:rPr lang="en-US" sz="1600" dirty="0" err="1">
+                <a:latin typeface="Helvetica Neue"/>
+              </a:rPr>
+              <a:t>giá</a:t>
             </a:r>
             <a:r>
               <a:rPr lang="en-US" sz="1600" dirty="0">
@@ -9097,6 +7510,51 @@
               <a:rPr lang="en-US" sz="1600" dirty="0" err="1">
                 <a:latin typeface="Helvetica Neue"/>
               </a:rPr>
+              <a:t>trị</a:t>
+            </a:r>
+            <a:r>
+              <a:rPr lang="en-US" sz="1600" dirty="0">
+                <a:latin typeface="Helvetica Neue"/>
+              </a:rPr>
+              <a:t>.</a:t>
+            </a:r>
+          </a:p>
+          <a:p>
+            <a:pPr algn="just"/>
+            <a:r>
+              <a:rPr lang="en-US" sz="1600" dirty="0">
+                <a:latin typeface="Helvetica Neue"/>
+              </a:rPr>
+              <a:t>- </a:t>
+            </a:r>
+            <a:r>
+              <a:rPr lang="en-US" sz="1600" dirty="0" err="1">
+                <a:latin typeface="Helvetica Neue"/>
+              </a:rPr>
+              <a:t>info_est_value</a:t>
+            </a:r>
+            <a:r>
+              <a:rPr lang="en-US" sz="1600" dirty="0">
+                <a:latin typeface="Helvetica Neue"/>
+              </a:rPr>
+              <a:t> </a:t>
+            </a:r>
+            <a:r>
+              <a:rPr lang="en-US" sz="1600" dirty="0" err="1">
+                <a:latin typeface="Helvetica Neue"/>
+              </a:rPr>
+              <a:t>thiếu</a:t>
+            </a:r>
+            <a:r>
+              <a:rPr lang="en-US" sz="1600" dirty="0">
+                <a:latin typeface="Helvetica Neue"/>
+              </a:rPr>
+              <a:t> 8771 </a:t>
+            </a:r>
+            <a:r>
+              <a:rPr lang="en-US" sz="1600" dirty="0" err="1">
+                <a:latin typeface="Helvetica Neue"/>
+              </a:rPr>
               <a:t>giá</a:t>
             </a:r>
             <a:r>
@@ -9124,25 +7582,37 @@
               <a:rPr lang="en-US" sz="1600" dirty="0">
                 <a:latin typeface="Helvetica Neue"/>
               </a:rPr>
-              <a:t>- toilets </a:t>
+              <a:t>- </a:t>
             </a:r>
             <a:r>
               <a:rPr lang="en-US" sz="1600" dirty="0" err="1">
                 <a:latin typeface="Helvetica Neue"/>
               </a:rPr>
+              <a:t>info_sold_price</a:t>
+            </a:r>
+            <a:r>
+              <a:rPr lang="en-US" sz="1600" dirty="0">
+                <a:latin typeface="Helvetica Neue"/>
+              </a:rPr>
+              <a:t> </a:t>
+            </a:r>
+            <a:r>
+              <a:rPr lang="en-US" sz="1600" dirty="0" err="1">
+                <a:latin typeface="Helvetica Neue"/>
+              </a:rPr>
               <a:t>thiếu</a:t>
             </a:r>
             <a:r>
               <a:rPr lang="en-US" sz="1600" dirty="0">
                 <a:latin typeface="Helvetica Neue"/>
               </a:rPr>
-              <a:t> </a:t>
-            </a:r>
-            <a:r>
-              <a:rPr lang="en-US" sz="1600" b="1" dirty="0">
-                <a:latin typeface="Helvetica Neue"/>
-              </a:rPr>
-              <a:t>11546</a:t>
+              <a:t> 934 </a:t>
+            </a:r>
+            <a:r>
+              <a:rPr lang="en-US" sz="1600" dirty="0" err="1">
+                <a:latin typeface="Helvetica Neue"/>
+              </a:rPr>
+              <a:t>giá</a:t>
             </a:r>
             <a:r>
               <a:rPr lang="en-US" sz="1600" dirty="0">
@@ -9154,6 +7624,51 @@
               <a:rPr lang="en-US" sz="1600" dirty="0" err="1">
                 <a:latin typeface="Helvetica Neue"/>
               </a:rPr>
+              <a:t>trị</a:t>
+            </a:r>
+            <a:r>
+              <a:rPr lang="en-US" sz="1600" dirty="0">
+                <a:latin typeface="Helvetica Neue"/>
+              </a:rPr>
+              <a:t>.</a:t>
+            </a:r>
+          </a:p>
+          <a:p>
+            <a:pPr algn="just"/>
+            <a:r>
+              <a:rPr lang="en-US" sz="1600" dirty="0">
+                <a:latin typeface="Helvetica Neue"/>
+              </a:rPr>
+              <a:t>- </a:t>
+            </a:r>
+            <a:r>
+              <a:rPr lang="en-US" sz="1600" dirty="0" err="1">
+                <a:latin typeface="Helvetica Neue"/>
+              </a:rPr>
+              <a:t>info_property_id</a:t>
+            </a:r>
+            <a:r>
+              <a:rPr lang="en-US" sz="1600" dirty="0">
+                <a:latin typeface="Helvetica Neue"/>
+              </a:rPr>
+              <a:t> </a:t>
+            </a:r>
+            <a:r>
+              <a:rPr lang="en-US" sz="1600" dirty="0" err="1">
+                <a:latin typeface="Helvetica Neue"/>
+              </a:rPr>
+              <a:t>thiếu</a:t>
+            </a:r>
+            <a:r>
+              <a:rPr lang="en-US" sz="1600" dirty="0">
+                <a:latin typeface="Helvetica Neue"/>
+              </a:rPr>
+              <a:t> 151 </a:t>
+            </a:r>
+            <a:r>
+              <a:rPr lang="en-US" sz="1600" dirty="0" err="1">
+                <a:latin typeface="Helvetica Neue"/>
+              </a:rPr>
               <a:t>giá</a:t>
             </a:r>
             <a:r>
@@ -9181,25 +7696,37 @@
               <a:rPr lang="en-US" sz="1600" dirty="0">
                 <a:latin typeface="Helvetica Neue"/>
               </a:rPr>
-              <a:t>- entrance </a:t>
+              <a:t>- </a:t>
             </a:r>
             <a:r>
               <a:rPr lang="en-US" sz="1600" dirty="0" err="1">
                 <a:latin typeface="Helvetica Neue"/>
               </a:rPr>
+              <a:t>taxes_land</a:t>
+            </a:r>
+            <a:r>
+              <a:rPr lang="en-US" sz="1600" dirty="0">
+                <a:latin typeface="Helvetica Neue"/>
+              </a:rPr>
+              <a:t> </a:t>
+            </a:r>
+            <a:r>
+              <a:rPr lang="en-US" sz="1600" dirty="0" err="1">
+                <a:latin typeface="Helvetica Neue"/>
+              </a:rPr>
               <a:t>thiếu</a:t>
             </a:r>
             <a:r>
               <a:rPr lang="en-US" sz="1600" dirty="0">
                 <a:latin typeface="Helvetica Neue"/>
               </a:rPr>
-              <a:t> </a:t>
-            </a:r>
-            <a:r>
-              <a:rPr lang="en-US" sz="1600" b="1" dirty="0">
-                <a:latin typeface="Helvetica Neue"/>
-              </a:rPr>
-              <a:t>9261</a:t>
+              <a:t> 701 </a:t>
+            </a:r>
+            <a:r>
+              <a:rPr lang="en-US" sz="1600" dirty="0" err="1">
+                <a:latin typeface="Helvetica Neue"/>
+              </a:rPr>
+              <a:t>giá</a:t>
             </a:r>
             <a:r>
               <a:rPr lang="en-US" sz="1600" dirty="0">
@@ -9211,6 +7738,51 @@
               <a:rPr lang="en-US" sz="1600" dirty="0" err="1">
                 <a:latin typeface="Helvetica Neue"/>
               </a:rPr>
+              <a:t>trị</a:t>
+            </a:r>
+            <a:r>
+              <a:rPr lang="en-US" sz="1600" dirty="0">
+                <a:latin typeface="Helvetica Neue"/>
+              </a:rPr>
+              <a:t>.</a:t>
+            </a:r>
+          </a:p>
+          <a:p>
+            <a:pPr algn="just"/>
+            <a:r>
+              <a:rPr lang="en-US" sz="1600" dirty="0">
+                <a:latin typeface="Helvetica Neue"/>
+              </a:rPr>
+              <a:t>- </a:t>
+            </a:r>
+            <a:r>
+              <a:rPr lang="en-US" sz="1600" dirty="0" err="1">
+                <a:latin typeface="Helvetica Neue"/>
+              </a:rPr>
+              <a:t>taxes_improvements</a:t>
+            </a:r>
+            <a:r>
+              <a:rPr lang="en-US" sz="1600" dirty="0">
+                <a:latin typeface="Helvetica Neue"/>
+              </a:rPr>
+              <a:t> </a:t>
+            </a:r>
+            <a:r>
+              <a:rPr lang="en-US" sz="1600" dirty="0" err="1">
+                <a:latin typeface="Helvetica Neue"/>
+              </a:rPr>
+              <a:t>thiếu</a:t>
+            </a:r>
+            <a:r>
+              <a:rPr lang="en-US" sz="1600" dirty="0">
+                <a:latin typeface="Helvetica Neue"/>
+              </a:rPr>
+              <a:t> 701 </a:t>
+            </a:r>
+            <a:r>
+              <a:rPr lang="en-US" sz="1600" dirty="0" err="1">
+                <a:latin typeface="Helvetica Neue"/>
+              </a:rPr>
               <a:t>giá</a:t>
             </a:r>
             <a:r>
@@ -9225,9 +7797,12 @@
               </a:rPr>
               <a:t>trị</a:t>
             </a:r>
-            <a:endParaRPr lang="en-US" sz="1600" dirty="0">
-              <a:latin typeface="Helvetica Neue"/>
-            </a:endParaRPr>
+            <a:r>
+              <a:rPr lang="en-US" sz="1600" dirty="0">
+                <a:latin typeface="Helvetica Neue"/>
+              </a:rPr>
+              <a:t>.</a:t>
+            </a:r>
           </a:p>
           <a:p>
             <a:pPr algn="just"/>
@@ -9241,7 +7816,7 @@
               <a:rPr lang="en-US" sz="1600" dirty="0" err="1">
                 <a:latin typeface="Helvetica Neue"/>
               </a:rPr>
-              <a:t>house_aspect</a:t>
+              <a:t>taxes_total</a:t>
             </a:r>
             <a:r>
               <a:rPr lang="en-US" sz="1600" dirty="0">
@@ -9259,13 +7834,13 @@
               <a:rPr lang="en-US" sz="1600" dirty="0">
                 <a:latin typeface="Helvetica Neue"/>
               </a:rPr>
-              <a:t> </a:t>
-            </a:r>
-            <a:r>
-              <a:rPr lang="en-US" sz="1600" b="1" dirty="0">
-                <a:latin typeface="Helvetica Neue"/>
-              </a:rPr>
-              <a:t>15932</a:t>
+              <a:t> 701 </a:t>
+            </a:r>
+            <a:r>
+              <a:rPr lang="en-US" sz="1600" dirty="0" err="1">
+                <a:latin typeface="Helvetica Neue"/>
+              </a:rPr>
+              <a:t>giá</a:t>
             </a:r>
             <a:r>
               <a:rPr lang="en-US" sz="1600" dirty="0">
@@ -9277,6 +7852,51 @@
               <a:rPr lang="en-US" sz="1600" dirty="0" err="1">
                 <a:latin typeface="Helvetica Neue"/>
               </a:rPr>
+              <a:t>trị</a:t>
+            </a:r>
+            <a:r>
+              <a:rPr lang="en-US" sz="1600" dirty="0">
+                <a:latin typeface="Helvetica Neue"/>
+              </a:rPr>
+              <a:t>.</a:t>
+            </a:r>
+          </a:p>
+          <a:p>
+            <a:pPr algn="just"/>
+            <a:r>
+              <a:rPr lang="en-US" sz="1600" dirty="0">
+                <a:latin typeface="Helvetica Neue"/>
+              </a:rPr>
+              <a:t>- </a:t>
+            </a:r>
+            <a:r>
+              <a:rPr lang="en-US" sz="1600" dirty="0" err="1">
+                <a:latin typeface="Helvetica Neue"/>
+              </a:rPr>
+              <a:t>taxes_taxes</a:t>
+            </a:r>
+            <a:r>
+              <a:rPr lang="en-US" sz="1600" dirty="0">
+                <a:latin typeface="Helvetica Neue"/>
+              </a:rPr>
+              <a:t> </a:t>
+            </a:r>
+            <a:r>
+              <a:rPr lang="en-US" sz="1600" dirty="0" err="1">
+                <a:latin typeface="Helvetica Neue"/>
+              </a:rPr>
+              <a:t>thiếu</a:t>
+            </a:r>
+            <a:r>
+              <a:rPr lang="en-US" sz="1600" dirty="0">
+                <a:latin typeface="Helvetica Neue"/>
+              </a:rPr>
+              <a:t> 701 </a:t>
+            </a:r>
+            <a:r>
+              <a:rPr lang="en-US" sz="1600" dirty="0" err="1">
+                <a:latin typeface="Helvetica Neue"/>
+              </a:rPr>
               <a:t>giá</a:t>
             </a:r>
             <a:r>
@@ -9297,129 +7917,6 @@
               </a:rPr>
               <a:t>.</a:t>
             </a:r>
-          </a:p>
-          <a:p>
-            <a:pPr algn="just"/>
-            <a:r>
-              <a:rPr lang="en-US" sz="1600" dirty="0">
-                <a:latin typeface="Helvetica Neue"/>
-              </a:rPr>
-              <a:t>- </a:t>
-            </a:r>
-            <a:r>
-              <a:rPr lang="en-US" sz="1600" dirty="0" err="1">
-                <a:latin typeface="Helvetica Neue"/>
-              </a:rPr>
-              <a:t>balcony_aspect</a:t>
-            </a:r>
-            <a:r>
-              <a:rPr lang="en-US" sz="1600" dirty="0">
-                <a:latin typeface="Helvetica Neue"/>
-              </a:rPr>
-              <a:t> </a:t>
-            </a:r>
-            <a:r>
-              <a:rPr lang="en-US" sz="1600" dirty="0" err="1">
-                <a:latin typeface="Helvetica Neue"/>
-              </a:rPr>
-              <a:t>thiếu</a:t>
-            </a:r>
-            <a:r>
-              <a:rPr lang="en-US" sz="1600" dirty="0">
-                <a:latin typeface="Helvetica Neue"/>
-              </a:rPr>
-              <a:t> </a:t>
-            </a:r>
-            <a:r>
-              <a:rPr lang="en-US" sz="1600" b="1" dirty="0">
-                <a:latin typeface="Helvetica Neue"/>
-              </a:rPr>
-              <a:t>17839</a:t>
-            </a:r>
-            <a:r>
-              <a:rPr lang="en-US" sz="1600" dirty="0">
-                <a:latin typeface="Helvetica Neue"/>
-              </a:rPr>
-              <a:t> </a:t>
-            </a:r>
-            <a:r>
-              <a:rPr lang="en-US" sz="1600" dirty="0" err="1">
-                <a:latin typeface="Helvetica Neue"/>
-              </a:rPr>
-              <a:t>giá</a:t>
-            </a:r>
-            <a:r>
-              <a:rPr lang="en-US" sz="1600" dirty="0">
-                <a:latin typeface="Helvetica Neue"/>
-              </a:rPr>
-              <a:t> </a:t>
-            </a:r>
-            <a:r>
-              <a:rPr lang="en-US" sz="1600" dirty="0" err="1">
-                <a:latin typeface="Helvetica Neue"/>
-              </a:rPr>
-              <a:t>trị</a:t>
-            </a:r>
-            <a:r>
-              <a:rPr lang="en-US" sz="1600" dirty="0">
-                <a:latin typeface="Helvetica Neue"/>
-              </a:rPr>
-              <a:t>.</a:t>
-            </a:r>
-          </a:p>
-          <a:p>
-            <a:pPr algn="just"/>
-            <a:r>
-              <a:rPr lang="en-US" sz="1600" dirty="0">
-                <a:latin typeface="Helvetica Neue"/>
-              </a:rPr>
-              <a:t>- interior </a:t>
-            </a:r>
-            <a:r>
-              <a:rPr lang="en-US" sz="1600" dirty="0" err="1">
-                <a:latin typeface="Helvetica Neue"/>
-              </a:rPr>
-              <a:t>thiếu</a:t>
-            </a:r>
-            <a:r>
-              <a:rPr lang="en-US" sz="1600" dirty="0">
-                <a:latin typeface="Helvetica Neue"/>
-              </a:rPr>
-              <a:t> </a:t>
-            </a:r>
-            <a:r>
-              <a:rPr lang="en-US" sz="1600" b="1" dirty="0">
-                <a:latin typeface="Helvetica Neue"/>
-              </a:rPr>
-              <a:t>15986</a:t>
-            </a:r>
-            <a:r>
-              <a:rPr lang="en-US" sz="1600" dirty="0">
-                <a:latin typeface="Helvetica Neue"/>
-              </a:rPr>
-              <a:t> </a:t>
-            </a:r>
-            <a:r>
-              <a:rPr lang="en-US" sz="1600" dirty="0" err="1">
-                <a:latin typeface="Helvetica Neue"/>
-              </a:rPr>
-              <a:t>giá</a:t>
-            </a:r>
-            <a:r>
-              <a:rPr lang="en-US" sz="1600" dirty="0">
-                <a:latin typeface="Helvetica Neue"/>
-              </a:rPr>
-              <a:t> </a:t>
-            </a:r>
-            <a:r>
-              <a:rPr lang="en-US" sz="1600" dirty="0" err="1">
-                <a:latin typeface="Helvetica Neue"/>
-              </a:rPr>
-              <a:t>trị</a:t>
-            </a:r>
-            <a:endParaRPr lang="en-US" sz="1600" dirty="0">
-              <a:latin typeface="Helvetica Neue"/>
-            </a:endParaRPr>
           </a:p>
         </p:txBody>
       </p:sp>
@@ -9445,7 +7942,7 @@
         </p:blipFill>
         <p:spPr>
           <a:xfrm flipH="1">
-            <a:off x="1712971" y="3429000"/>
+            <a:off x="5348732" y="3473213"/>
             <a:ext cx="1807021" cy="1930791"/>
           </a:xfrm>
           <a:prstGeom prst="rect">
@@ -9467,7 +7964,7 @@
         </p:nvSpPr>
         <p:spPr>
           <a:xfrm>
-            <a:off x="5205046" y="997107"/>
+            <a:off x="5205046" y="610408"/>
             <a:ext cx="6499566" cy="1077218"/>
           </a:xfrm>
           <a:prstGeom prst="rect">
@@ -10322,8 +8819,8 @@
         </p:nvSpPr>
         <p:spPr>
           <a:xfrm>
-            <a:off x="5205046" y="3327883"/>
-            <a:ext cx="6499566" cy="1323439"/>
+            <a:off x="5205046" y="2369989"/>
+            <a:ext cx="6499566" cy="1077218"/>
           </a:xfrm>
           <a:prstGeom prst="rect">
             <a:avLst/>
@@ -10660,7 +9157,7 @@
               <a:rPr lang="en-US" sz="1600" dirty="0">
                 <a:latin typeface="Helvetica Neue"/>
               </a:rPr>
-              <a:t> </a:t>
+              <a:t> (</a:t>
             </a:r>
             <a:r>
               <a:rPr lang="en-US" sz="1600" dirty="0" err="1">
@@ -10678,31 +9175,19 @@
               <a:rPr lang="en-US" sz="1600" dirty="0">
                 <a:latin typeface="Helvetica Neue"/>
               </a:rPr>
-              <a:t> bedrooms, toilets, </a:t>
+              <a:t> </a:t>
             </a:r>
             <a:r>
               <a:rPr lang="en-US" sz="1600" dirty="0" err="1">
                 <a:latin typeface="Helvetica Neue"/>
               </a:rPr>
-              <a:t>house_aspect</a:t>
+              <a:t>info_est_value</a:t>
             </a:r>
             <a:r>
               <a:rPr lang="en-US" sz="1600" dirty="0">
                 <a:latin typeface="Helvetica Neue"/>
               </a:rPr>
-              <a:t>, </a:t>
-            </a:r>
-            <a:r>
-              <a:rPr lang="en-US" sz="1600" dirty="0" err="1">
-                <a:latin typeface="Helvetica Neue"/>
-              </a:rPr>
-              <a:t>balcony_aspect</a:t>
-            </a:r>
-            <a:r>
-              <a:rPr lang="en-US" sz="1600" dirty="0">
-                <a:latin typeface="Helvetica Neue"/>
-              </a:rPr>
-              <a:t>. </a:t>
+              <a:t>). </a:t>
             </a:r>
             <a:r>
               <a:rPr lang="en-US" sz="1600" dirty="0" err="1">
@@ -11093,8 +9578,8 @@
         </p:nvSpPr>
         <p:spPr>
           <a:xfrm>
-            <a:off x="4121834" y="829993"/>
-            <a:ext cx="1083212" cy="492370"/>
+            <a:off x="4304714" y="695976"/>
+            <a:ext cx="900332" cy="492370"/>
           </a:xfrm>
           <a:prstGeom prst="curvedDownArrow">
             <a:avLst/>
@@ -11150,9 +9635,9 @@
           <p:nvPr/>
         </p:nvSpPr>
         <p:spPr>
-          <a:xfrm flipH="1" flipV="1">
-            <a:off x="1366150" y="3231599"/>
-            <a:ext cx="346822" cy="755403"/>
+          <a:xfrm rot="16200000" flipH="1" flipV="1">
+            <a:off x="4649716" y="3655978"/>
+            <a:ext cx="346822" cy="1051209"/>
           </a:xfrm>
           <a:prstGeom prst="curvedLeftArrow">
             <a:avLst/>
@@ -11209,8 +9694,8 @@
         </p:nvSpPr>
         <p:spPr>
           <a:xfrm>
-            <a:off x="8070168" y="2082019"/>
-            <a:ext cx="510115" cy="1245864"/>
+            <a:off x="8160904" y="1679066"/>
+            <a:ext cx="510115" cy="690923"/>
           </a:xfrm>
           <a:prstGeom prst="curvedLeftArrow">
             <a:avLst/>
@@ -11257,6 +9742,155 @@
     <p:extLst>
       <p:ext uri="{BB962C8B-B14F-4D97-AF65-F5344CB8AC3E}">
         <p14:creationId xmlns:p14="http://schemas.microsoft.com/office/powerpoint/2010/main" val="4283259022"/>
+      </p:ext>
+    </p:extLst>
+  </p:cSld>
+  <p:clrMapOvr>
+    <a:masterClrMapping/>
+  </p:clrMapOvr>
+</p:sld>
+</file>
+
+<file path=ppt/slides/slide12.xml><?xml version="1.0" encoding="utf-8"?>
+<p:sld xmlns:a="http://schemas.openxmlformats.org/drawingml/2006/main" xmlns:r="http://schemas.openxmlformats.org/officeDocument/2006/relationships" xmlns:p="http://schemas.openxmlformats.org/presentationml/2006/main">
+  <p:cSld>
+    <p:spTree>
+      <p:nvGrpSpPr>
+        <p:cNvPr id="1" name=""/>
+        <p:cNvGrpSpPr/>
+        <p:nvPr/>
+      </p:nvGrpSpPr>
+      <p:grpSpPr>
+        <a:xfrm>
+          <a:off x="0" y="0"/>
+          <a:ext cx="0" cy="0"/>
+          <a:chOff x="0" y="0"/>
+          <a:chExt cx="0" cy="0"/>
+        </a:xfrm>
+      </p:grpSpPr>
+      <p:sp>
+        <p:nvSpPr>
+          <p:cNvPr id="5" name="Title 3">
+            <a:extLst>
+              <a:ext uri="{FF2B5EF4-FFF2-40B4-BE49-F238E27FC236}">
+                <a16:creationId xmlns:a16="http://schemas.microsoft.com/office/drawing/2014/main" id="{19108840-FFCC-42C7-88AD-7039908F3F4D}"/>
+              </a:ext>
+            </a:extLst>
+          </p:cNvPr>
+          <p:cNvSpPr>
+            <a:spLocks noGrp="1"/>
+          </p:cNvSpPr>
+          <p:nvPr>
+            <p:ph type="title"/>
+          </p:nvPr>
+        </p:nvSpPr>
+        <p:spPr>
+          <a:xfrm>
+            <a:off x="1885071" y="5474331"/>
+            <a:ext cx="9534893" cy="689514"/>
+          </a:xfrm>
+        </p:spPr>
+        <p:txBody>
+          <a:bodyPr>
+            <a:noAutofit/>
+          </a:bodyPr>
+          <a:lstStyle/>
+          <a:p>
+            <a:pPr algn="r"/>
+            <a:r>
+              <a:rPr lang="en-US" sz="2400" b="1" dirty="0">
+                <a:solidFill>
+                  <a:schemeClr val="bg1"/>
+                </a:solidFill>
+                <a:latin typeface="Calibri (Body)"/>
+              </a:rPr>
+              <a:t>THU THẬP DỮ LIỆU –  10 DÒNG ĐẦU TIÊN CỦA DỮ LIỆU Đ</a:t>
+            </a:r>
+            <a:r>
+              <a:rPr lang="vi-VN" sz="2400" b="1" dirty="0">
+                <a:solidFill>
+                  <a:schemeClr val="bg1"/>
+                </a:solidFill>
+                <a:latin typeface="Calibri (Body)"/>
+              </a:rPr>
+              <a:t>Ư</a:t>
+            </a:r>
+            <a:r>
+              <a:rPr lang="en-US" sz="2400" b="1" dirty="0">
+                <a:solidFill>
+                  <a:schemeClr val="bg1"/>
+                </a:solidFill>
+                <a:latin typeface="Calibri (Body)"/>
+              </a:rPr>
+              <a:t>ỢC THU THẬP</a:t>
+            </a:r>
+          </a:p>
+        </p:txBody>
+      </p:sp>
+      <p:sp>
+        <p:nvSpPr>
+          <p:cNvPr id="14" name="Slide Number Placeholder 13">
+            <a:extLst>
+              <a:ext uri="{FF2B5EF4-FFF2-40B4-BE49-F238E27FC236}">
+                <a16:creationId xmlns:a16="http://schemas.microsoft.com/office/drawing/2014/main" id="{980EF428-8355-4A47-B751-792490A6FC45}"/>
+              </a:ext>
+            </a:extLst>
+          </p:cNvPr>
+          <p:cNvSpPr>
+            <a:spLocks noGrp="1"/>
+          </p:cNvSpPr>
+          <p:nvPr>
+            <p:ph type="sldNum" sz="quarter" idx="12"/>
+          </p:nvPr>
+        </p:nvSpPr>
+        <p:spPr/>
+        <p:txBody>
+          <a:bodyPr/>
+          <a:lstStyle/>
+          <a:p>
+            <a:fld id="{D57F1E4F-1CFF-5643-939E-217C01CDF565}" type="slidenum">
+              <a:rPr lang="en-US" smtClean="0"/>
+              <a:pPr/>
+              <a:t>12</a:t>
+            </a:fld>
+            <a:endParaRPr lang="en-US" dirty="0"/>
+          </a:p>
+        </p:txBody>
+      </p:sp>
+      <p:pic>
+        <p:nvPicPr>
+          <p:cNvPr id="2" name="Picture 1">
+            <a:extLst>
+              <a:ext uri="{FF2B5EF4-FFF2-40B4-BE49-F238E27FC236}">
+                <a16:creationId xmlns:a16="http://schemas.microsoft.com/office/drawing/2014/main" id="{899E508B-CEED-4D34-AEBC-592B30E62620}"/>
+              </a:ext>
+            </a:extLst>
+          </p:cNvPr>
+          <p:cNvPicPr>
+            <a:picLocks noChangeAspect="1"/>
+          </p:cNvPicPr>
+          <p:nvPr/>
+        </p:nvPicPr>
+        <p:blipFill>
+          <a:blip r:embed="rId3"/>
+          <a:stretch>
+            <a:fillRect/>
+          </a:stretch>
+        </p:blipFill>
+        <p:spPr>
+          <a:xfrm>
+            <a:off x="1243012" y="647530"/>
+            <a:ext cx="9705975" cy="4529589"/>
+          </a:xfrm>
+          <a:prstGeom prst="rect">
+            <a:avLst/>
+          </a:prstGeom>
+        </p:spPr>
+      </p:pic>
+    </p:spTree>
+    <p:extLst>
+      <p:ext uri="{BB962C8B-B14F-4D97-AF65-F5344CB8AC3E}">
+        <p14:creationId xmlns:p14="http://schemas.microsoft.com/office/powerpoint/2010/main" val="766188317"/>
       </p:ext>
     </p:extLst>
   </p:cSld>

</xml_diff>